<commit_message>
add new thoughts to coding practices
</commit_message>
<xml_diff>
--- a/yazlovytskyy/1. Coding Practices/coding practices.pptx
+++ b/yazlovytskyy/1. Coding Practices/coding practices.pptx
@@ -5,21 +5,29 @@
     <p:sldMasterId id="2147483648" r:id="rId1"/>
   </p:sldMasterIdLst>
   <p:notesMasterIdLst>
-    <p:notesMasterId r:id="rId14"/>
+    <p:notesMasterId r:id="rId22"/>
   </p:notesMasterIdLst>
   <p:sldIdLst>
-    <p:sldId id="270" r:id="rId2"/>
-    <p:sldId id="258" r:id="rId3"/>
-    <p:sldId id="259" r:id="rId4"/>
-    <p:sldId id="262" r:id="rId5"/>
-    <p:sldId id="260" r:id="rId6"/>
-    <p:sldId id="261" r:id="rId7"/>
-    <p:sldId id="267" r:id="rId8"/>
-    <p:sldId id="268" r:id="rId9"/>
-    <p:sldId id="266" r:id="rId10"/>
-    <p:sldId id="265" r:id="rId11"/>
-    <p:sldId id="269" r:id="rId12"/>
-    <p:sldId id="264" r:id="rId13"/>
+    <p:sldId id="276" r:id="rId2"/>
+    <p:sldId id="270" r:id="rId3"/>
+    <p:sldId id="277" r:id="rId4"/>
+    <p:sldId id="275" r:id="rId5"/>
+    <p:sldId id="273" r:id="rId6"/>
+    <p:sldId id="271" r:id="rId7"/>
+    <p:sldId id="272" r:id="rId8"/>
+    <p:sldId id="274" r:id="rId9"/>
+    <p:sldId id="278" r:id="rId10"/>
+    <p:sldId id="258" r:id="rId11"/>
+    <p:sldId id="259" r:id="rId12"/>
+    <p:sldId id="262" r:id="rId13"/>
+    <p:sldId id="260" r:id="rId14"/>
+    <p:sldId id="261" r:id="rId15"/>
+    <p:sldId id="267" r:id="rId16"/>
+    <p:sldId id="268" r:id="rId17"/>
+    <p:sldId id="266" r:id="rId18"/>
+    <p:sldId id="265" r:id="rId19"/>
+    <p:sldId id="269" r:id="rId20"/>
+    <p:sldId id="264" r:id="rId21"/>
   </p:sldIdLst>
   <p:sldSz cx="9144000" cy="6858000" type="screen4x3"/>
   <p:notesSz cx="6858000" cy="9144000"/>
@@ -204,7 +212,7 @@
             <a:fld id="{DAFF5AB6-430B-4C97-8CD4-2103EADB8074}" type="datetimeFigureOut">
               <a:rPr lang="uk-UA" smtClean="0"/>
               <a:pPr/>
-              <a:t>26.04.2011</a:t>
+              <a:t>28.04.2011</a:t>
             </a:fld>
             <a:endParaRPr lang="uk-UA"/>
           </a:p>
@@ -375,7 +383,7 @@
     </p:spTree>
     <p:extLst>
       <p:ext uri="{BB962C8B-B14F-4D97-AF65-F5344CB8AC3E}">
-        <p14:creationId xmlns:p14="http://schemas.microsoft.com/office/powerpoint/2010/main" xmlns="" val="3758022159"/>
+        <p14:creationId xmlns="" xmlns:p14="http://schemas.microsoft.com/office/powerpoint/2010/main" val="3758022159"/>
       </p:ext>
     </p:extLst>
   </p:cSld>
@@ -543,7 +551,7 @@
             <a:fld id="{576218F1-56F4-48B8-B4F9-BC35F510E0D9}" type="slidenum">
               <a:rPr lang="uk-UA" smtClean="0"/>
               <a:pPr/>
-              <a:t>2</a:t>
+              <a:t>10</a:t>
             </a:fld>
             <a:endParaRPr lang="uk-UA"/>
           </a:p>
@@ -625,7 +633,7 @@
             <a:fld id="{576218F1-56F4-48B8-B4F9-BC35F510E0D9}" type="slidenum">
               <a:rPr lang="uk-UA" smtClean="0"/>
               <a:pPr/>
-              <a:t>3</a:t>
+              <a:t>11</a:t>
             </a:fld>
             <a:endParaRPr lang="uk-UA"/>
           </a:p>
@@ -723,7 +731,7 @@
             <a:fld id="{576218F1-56F4-48B8-B4F9-BC35F510E0D9}" type="slidenum">
               <a:rPr lang="uk-UA" smtClean="0"/>
               <a:pPr/>
-              <a:t>4</a:t>
+              <a:t>12</a:t>
             </a:fld>
             <a:endParaRPr lang="uk-UA"/>
           </a:p>
@@ -833,7 +841,7 @@
             <a:fld id="{576218F1-56F4-48B8-B4F9-BC35F510E0D9}" type="slidenum">
               <a:rPr lang="uk-UA" smtClean="0"/>
               <a:pPr/>
-              <a:t>5</a:t>
+              <a:t>13</a:t>
             </a:fld>
             <a:endParaRPr lang="uk-UA"/>
           </a:p>
@@ -923,7 +931,7 @@
             <a:fld id="{576218F1-56F4-48B8-B4F9-BC35F510E0D9}" type="slidenum">
               <a:rPr lang="uk-UA" smtClean="0"/>
               <a:pPr/>
-              <a:t>6</a:t>
+              <a:t>14</a:t>
             </a:fld>
             <a:endParaRPr lang="uk-UA"/>
           </a:p>
@@ -1003,7 +1011,7 @@
             <a:fld id="{576218F1-56F4-48B8-B4F9-BC35F510E0D9}" type="slidenum">
               <a:rPr lang="uk-UA" smtClean="0"/>
               <a:pPr/>
-              <a:t>8</a:t>
+              <a:t>16</a:t>
             </a:fld>
             <a:endParaRPr lang="uk-UA"/>
           </a:p>
@@ -1012,7 +1020,7 @@
     </p:spTree>
     <p:extLst>
       <p:ext uri="{BB962C8B-B14F-4D97-AF65-F5344CB8AC3E}">
-        <p14:creationId xmlns:p14="http://schemas.microsoft.com/office/powerpoint/2010/main" xmlns="" val="1101112114"/>
+        <p14:creationId xmlns="" xmlns:p14="http://schemas.microsoft.com/office/powerpoint/2010/main" val="1101112114"/>
       </p:ext>
     </p:extLst>
   </p:cSld>
@@ -1096,7 +1104,7 @@
             <a:fld id="{576218F1-56F4-48B8-B4F9-BC35F510E0D9}" type="slidenum">
               <a:rPr lang="uk-UA" smtClean="0"/>
               <a:pPr/>
-              <a:t>9</a:t>
+              <a:t>17</a:t>
             </a:fld>
             <a:endParaRPr lang="uk-UA"/>
           </a:p>
@@ -1105,7 +1113,7 @@
     </p:spTree>
     <p:extLst>
       <p:ext uri="{BB962C8B-B14F-4D97-AF65-F5344CB8AC3E}">
-        <p14:creationId xmlns:p14="http://schemas.microsoft.com/office/powerpoint/2010/main" xmlns="" val="238419811"/>
+        <p14:creationId xmlns="" xmlns:p14="http://schemas.microsoft.com/office/powerpoint/2010/main" val="238419811"/>
       </p:ext>
     </p:extLst>
   </p:cSld>
@@ -1191,7 +1199,7 @@
             <a:fld id="{576218F1-56F4-48B8-B4F9-BC35F510E0D9}" type="slidenum">
               <a:rPr lang="uk-UA" smtClean="0"/>
               <a:pPr/>
-              <a:t>10</a:t>
+              <a:t>18</a:t>
             </a:fld>
             <a:endParaRPr lang="uk-UA"/>
           </a:p>
@@ -1387,7 +1395,7 @@
             <a:fld id="{F02DFA6B-292B-433F-BE07-9B54C1DD9F82}" type="datetimeFigureOut">
               <a:rPr lang="uk-UA" smtClean="0"/>
               <a:pPr/>
-              <a:t>26.04.2011</a:t>
+              <a:t>28.04.2011</a:t>
             </a:fld>
             <a:endParaRPr lang="uk-UA"/>
           </a:p>
@@ -1554,7 +1562,7 @@
             <a:fld id="{F02DFA6B-292B-433F-BE07-9B54C1DD9F82}" type="datetimeFigureOut">
               <a:rPr lang="uk-UA" smtClean="0"/>
               <a:pPr/>
-              <a:t>26.04.2011</a:t>
+              <a:t>28.04.2011</a:t>
             </a:fld>
             <a:endParaRPr lang="uk-UA"/>
           </a:p>
@@ -1731,7 +1739,7 @@
             <a:fld id="{F02DFA6B-292B-433F-BE07-9B54C1DD9F82}" type="datetimeFigureOut">
               <a:rPr lang="uk-UA" smtClean="0"/>
               <a:pPr/>
-              <a:t>26.04.2011</a:t>
+              <a:t>28.04.2011</a:t>
             </a:fld>
             <a:endParaRPr lang="uk-UA"/>
           </a:p>
@@ -1898,7 +1906,7 @@
             <a:fld id="{F02DFA6B-292B-433F-BE07-9B54C1DD9F82}" type="datetimeFigureOut">
               <a:rPr lang="uk-UA" smtClean="0"/>
               <a:pPr/>
-              <a:t>26.04.2011</a:t>
+              <a:t>28.04.2011</a:t>
             </a:fld>
             <a:endParaRPr lang="uk-UA"/>
           </a:p>
@@ -2141,7 +2149,7 @@
             <a:fld id="{F02DFA6B-292B-433F-BE07-9B54C1DD9F82}" type="datetimeFigureOut">
               <a:rPr lang="uk-UA" smtClean="0"/>
               <a:pPr/>
-              <a:t>26.04.2011</a:t>
+              <a:t>28.04.2011</a:t>
             </a:fld>
             <a:endParaRPr lang="uk-UA"/>
           </a:p>
@@ -2426,7 +2434,7 @@
             <a:fld id="{F02DFA6B-292B-433F-BE07-9B54C1DD9F82}" type="datetimeFigureOut">
               <a:rPr lang="uk-UA" smtClean="0"/>
               <a:pPr/>
-              <a:t>26.04.2011</a:t>
+              <a:t>28.04.2011</a:t>
             </a:fld>
             <a:endParaRPr lang="uk-UA"/>
           </a:p>
@@ -2845,7 +2853,7 @@
             <a:fld id="{F02DFA6B-292B-433F-BE07-9B54C1DD9F82}" type="datetimeFigureOut">
               <a:rPr lang="uk-UA" smtClean="0"/>
               <a:pPr/>
-              <a:t>26.04.2011</a:t>
+              <a:t>28.04.2011</a:t>
             </a:fld>
             <a:endParaRPr lang="uk-UA"/>
           </a:p>
@@ -2960,7 +2968,7 @@
             <a:fld id="{F02DFA6B-292B-433F-BE07-9B54C1DD9F82}" type="datetimeFigureOut">
               <a:rPr lang="uk-UA" smtClean="0"/>
               <a:pPr/>
-              <a:t>26.04.2011</a:t>
+              <a:t>28.04.2011</a:t>
             </a:fld>
             <a:endParaRPr lang="uk-UA"/>
           </a:p>
@@ -3052,7 +3060,7 @@
             <a:fld id="{F02DFA6B-292B-433F-BE07-9B54C1DD9F82}" type="datetimeFigureOut">
               <a:rPr lang="uk-UA" smtClean="0"/>
               <a:pPr/>
-              <a:t>26.04.2011</a:t>
+              <a:t>28.04.2011</a:t>
             </a:fld>
             <a:endParaRPr lang="uk-UA"/>
           </a:p>
@@ -3326,7 +3334,7 @@
             <a:fld id="{F02DFA6B-292B-433F-BE07-9B54C1DD9F82}" type="datetimeFigureOut">
               <a:rPr lang="uk-UA" smtClean="0"/>
               <a:pPr/>
-              <a:t>26.04.2011</a:t>
+              <a:t>28.04.2011</a:t>
             </a:fld>
             <a:endParaRPr lang="uk-UA"/>
           </a:p>
@@ -3576,7 +3584,7 @@
             <a:fld id="{F02DFA6B-292B-433F-BE07-9B54C1DD9F82}" type="datetimeFigureOut">
               <a:rPr lang="uk-UA" smtClean="0"/>
               <a:pPr/>
-              <a:t>26.04.2011</a:t>
+              <a:t>28.04.2011</a:t>
             </a:fld>
             <a:endParaRPr lang="uk-UA"/>
           </a:p>
@@ -3786,7 +3794,7 @@
             <a:fld id="{F02DFA6B-292B-433F-BE07-9B54C1DD9F82}" type="datetimeFigureOut">
               <a:rPr lang="uk-UA" smtClean="0"/>
               <a:pPr/>
-              <a:t>26.04.2011</a:t>
+              <a:t>28.04.2011</a:t>
             </a:fld>
             <a:endParaRPr lang="uk-UA"/>
           </a:p>
@@ -4167,55 +4175,50 @@
             <p:ph type="title"/>
           </p:nvPr>
         </p:nvSpPr>
-        <p:spPr/>
-        <p:txBody>
-          <a:bodyPr/>
-          <a:lstStyle/>
-          <a:p>
-            <a:r>
-              <a:rPr lang="uk-UA" dirty="0" smtClean="0"/>
-              <a:t>Що потрібно хорошому коду ?</a:t>
-            </a:r>
-            <a:endParaRPr lang="uk-UA" dirty="0"/>
-          </a:p>
-        </p:txBody>
-      </p:sp>
-      <p:sp>
-        <p:nvSpPr>
-          <p:cNvPr id="3" name="Содержимое 2"/>
-          <p:cNvSpPr>
-            <a:spLocks noGrp="1"/>
-          </p:cNvSpPr>
-          <p:nvPr>
-            <p:ph idx="1"/>
-          </p:nvPr>
-        </p:nvSpPr>
-        <p:spPr/>
-        <p:txBody>
-          <a:bodyPr/>
-          <a:lstStyle/>
-          <a:p>
-            <a:pPr marL="514350" indent="-514350">
-              <a:buFont typeface="+mj-lt"/>
-              <a:buAutoNum type="arabicPeriod"/>
-            </a:pPr>
-            <a:r>
-              <a:rPr lang="uk-UA" sz="3600" b="1" dirty="0" smtClean="0"/>
-              <a:t>Чітко визначена мета (призначення). </a:t>
-            </a:r>
-          </a:p>
-          <a:p>
-            <a:pPr marL="514350" indent="-514350">
-              <a:buFont typeface="+mj-lt"/>
-              <a:buAutoNum type="arabicPeriod"/>
-            </a:pPr>
-            <a:r>
-              <a:rPr lang="uk-UA" dirty="0" smtClean="0"/>
-              <a:t>Правильне технічне вираження (реалізація)</a:t>
-            </a:r>
-          </a:p>
-        </p:txBody>
-      </p:sp>
+        <p:spPr>
+          <a:xfrm>
+            <a:off x="467544" y="260648"/>
+            <a:ext cx="8229600" cy="1143000"/>
+          </a:xfrm>
+        </p:spPr>
+        <p:txBody>
+          <a:bodyPr/>
+          <a:lstStyle/>
+          <a:p>
+            <a:r>
+              <a:rPr lang="uk-UA" b="1" dirty="0" smtClean="0"/>
+              <a:t>Програмування це Процес!</a:t>
+            </a:r>
+            <a:endParaRPr lang="uk-UA" b="1" dirty="0"/>
+          </a:p>
+        </p:txBody>
+      </p:sp>
+      <p:pic>
+        <p:nvPicPr>
+          <p:cNvPr id="1026" name="Picture 2" descr="http://maykach.ru/data/tinyuploads/CaptainObvious.jpg"/>
+          <p:cNvPicPr>
+            <a:picLocks noChangeAspect="1" noChangeArrowheads="1"/>
+          </p:cNvPicPr>
+          <p:nvPr/>
+        </p:nvPicPr>
+        <p:blipFill>
+          <a:blip r:embed="rId2" cstate="print"/>
+          <a:srcRect/>
+          <a:stretch>
+            <a:fillRect/>
+          </a:stretch>
+        </p:blipFill>
+        <p:spPr bwMode="auto">
+          <a:xfrm>
+            <a:off x="2915816" y="1340768"/>
+            <a:ext cx="3816424" cy="5243972"/>
+          </a:xfrm>
+          <a:prstGeom prst="rect">
+            <a:avLst/>
+          </a:prstGeom>
+          <a:noFill/>
+        </p:spPr>
+      </p:pic>
     </p:spTree>
   </p:cSld>
   <p:clrMapOvr>
@@ -4253,12 +4256,14 @@
         </p:nvSpPr>
         <p:spPr/>
         <p:txBody>
-          <a:bodyPr/>
+          <a:bodyPr>
+            <a:normAutofit/>
+          </a:bodyPr>
           <a:lstStyle/>
           <a:p>
             <a:r>
               <a:rPr lang="uk-UA" dirty="0" smtClean="0"/>
-              <a:t>Назви змінних</a:t>
+              <a:t>Характеристики хорошого коду</a:t>
             </a:r>
             <a:endParaRPr lang="uk-UA" dirty="0"/>
           </a:p>
@@ -4274,134 +4279,81 @@
             <p:ph idx="1"/>
           </p:nvPr>
         </p:nvSpPr>
-        <p:spPr/>
+        <p:spPr>
+          <a:xfrm>
+            <a:off x="457200" y="1600200"/>
+            <a:ext cx="8229600" cy="4493096"/>
+          </a:xfrm>
+        </p:spPr>
         <p:txBody>
           <a:bodyPr>
-            <a:normAutofit fontScale="92500" lnSpcReduction="20000"/>
+            <a:normAutofit/>
           </a:bodyPr>
           <a:lstStyle/>
           <a:p>
+            <a:pPr marL="914400" lvl="1" indent="-514350"/>
             <a:r>
               <a:rPr lang="uk-UA" b="1" dirty="0" smtClean="0"/>
-              <a:t>Назва змінної  відображає її призначення.</a:t>
-            </a:r>
-          </a:p>
-          <a:p>
+              <a:t>Зрозумілість</a:t>
+            </a:r>
+          </a:p>
+          <a:p>
+            <a:pPr marL="914400" lvl="1" indent="-514350"/>
             <a:r>
               <a:rPr lang="uk-UA" dirty="0" smtClean="0"/>
-              <a:t>Назви сутностей</a:t>
-            </a:r>
-          </a:p>
-          <a:p>
-            <a:pPr lvl="1"/>
-            <a:r>
-              <a:rPr lang="en-US" sz="2600" dirty="0" smtClean="0"/>
-              <a:t>user, report, </a:t>
-            </a:r>
-            <a:r>
-              <a:rPr lang="en-US" sz="2600" dirty="0" err="1" smtClean="0"/>
-              <a:t>oldReport</a:t>
-            </a:r>
-            <a:r>
-              <a:rPr lang="en-US" sz="2600" dirty="0" smtClean="0"/>
-              <a:t>, </a:t>
-            </a:r>
-            <a:r>
-              <a:rPr lang="en-US" sz="2600" dirty="0" err="1" smtClean="0"/>
-              <a:t>newReport</a:t>
-            </a:r>
-            <a:r>
-              <a:rPr lang="en-US" sz="2600" dirty="0" smtClean="0"/>
-              <a:t>, </a:t>
-            </a:r>
-            <a:r>
-              <a:rPr lang="en-US" sz="2600" dirty="0" err="1" smtClean="0"/>
-              <a:t>editedProduct</a:t>
-            </a:r>
-            <a:endParaRPr lang="en-US" sz="2600" dirty="0" smtClean="0"/>
-          </a:p>
-          <a:p>
-            <a:pPr lvl="1"/>
-            <a:r>
-              <a:rPr lang="en-US" sz="2600" strike="sngStrike" dirty="0" smtClean="0"/>
-              <a:t>user3</a:t>
-            </a:r>
-            <a:r>
-              <a:rPr lang="en-US" sz="2600" dirty="0" smtClean="0"/>
-              <a:t>, </a:t>
-            </a:r>
-            <a:r>
-              <a:rPr lang="en-US" sz="2600" strike="sngStrike" dirty="0" err="1" smtClean="0"/>
-              <a:t>justCreatedProduct</a:t>
-            </a:r>
-            <a:endParaRPr lang="en-US" sz="2600" strike="sngStrike" dirty="0" smtClean="0"/>
-          </a:p>
-          <a:p>
-            <a:r>
-              <a:rPr lang="uk-UA" dirty="0" err="1" smtClean="0"/>
-              <a:t>Паттерн</a:t>
-            </a:r>
+              <a:t>Зібраність</a:t>
+            </a:r>
+          </a:p>
+          <a:p>
+            <a:pPr marL="914400" lvl="1" indent="-514350"/>
             <a:r>
               <a:rPr lang="uk-UA" dirty="0" smtClean="0"/>
-              <a:t> орієнтовані назви</a:t>
-            </a:r>
-          </a:p>
-          <a:p>
-            <a:pPr lvl="1"/>
-            <a:r>
-              <a:rPr lang="en-US" sz="2600" dirty="0" err="1" smtClean="0"/>
-              <a:t>SallaryCalculationStrategy</a:t>
-            </a:r>
-            <a:r>
-              <a:rPr lang="en-US" sz="2600" dirty="0" smtClean="0"/>
-              <a:t>, </a:t>
-            </a:r>
-            <a:r>
-              <a:rPr lang="en-US" sz="2600" dirty="0" err="1" smtClean="0"/>
-              <a:t>ReportBuilder</a:t>
-            </a:r>
-            <a:r>
-              <a:rPr lang="en-US" sz="2600" dirty="0" smtClean="0"/>
-              <a:t>, </a:t>
-            </a:r>
-            <a:r>
-              <a:rPr lang="en-US" sz="2600" dirty="0" err="1" smtClean="0"/>
-              <a:t>UserDao</a:t>
-            </a:r>
-            <a:endParaRPr lang="uk-UA" sz="2600" dirty="0" smtClean="0"/>
-          </a:p>
-          <a:p>
+              <a:t>Послідовність</a:t>
+            </a:r>
+          </a:p>
+          <a:p>
+            <a:pPr marL="914400" lvl="1" indent="-514350"/>
             <a:r>
               <a:rPr lang="uk-UA" dirty="0" smtClean="0"/>
-              <a:t>Назви специфічні для конкретного рішення</a:t>
-            </a:r>
-          </a:p>
-          <a:p>
-            <a:pPr lvl="1"/>
-            <a:r>
-              <a:rPr lang="en-US" sz="2600" dirty="0" err="1" smtClean="0"/>
-              <a:t>JobProcessor</a:t>
-            </a:r>
-            <a:endParaRPr lang="en-US" sz="2600" dirty="0" smtClean="0"/>
-          </a:p>
-          <a:p>
+              <a:t>Передбачуваність</a:t>
+            </a:r>
+          </a:p>
+          <a:p>
+            <a:pPr marL="914400" lvl="1" indent="-514350"/>
             <a:r>
               <a:rPr lang="uk-UA" dirty="0" smtClean="0"/>
-              <a:t>Допоміжні змінні в синтаксичних конструкціях</a:t>
-            </a:r>
-            <a:endParaRPr lang="en-US" dirty="0" smtClean="0"/>
-          </a:p>
-          <a:p>
-            <a:pPr lvl="1"/>
-            <a:r>
-              <a:rPr lang="en-US" sz="2600" dirty="0" smtClean="0"/>
-              <a:t>I, j </a:t>
-            </a:r>
-            <a:r>
-              <a:rPr lang="uk-UA" sz="2600" dirty="0" smtClean="0"/>
-              <a:t>в циклах</a:t>
-            </a:r>
-            <a:endParaRPr lang="uk-UA" sz="2600" dirty="0"/>
+              <a:t>Конкретність</a:t>
+            </a:r>
+            <a:endParaRPr lang="uk-UA" dirty="0" smtClean="0"/>
+          </a:p>
+          <a:p>
+            <a:pPr marL="914400" lvl="1" indent="-514350"/>
+            <a:r>
+              <a:rPr lang="uk-UA" dirty="0" smtClean="0"/>
+              <a:t>Мінімалістичність</a:t>
+            </a:r>
+          </a:p>
+          <a:p>
+            <a:pPr marL="914400" lvl="1" indent="-514350"/>
+            <a:r>
+              <a:rPr lang="uk-UA" dirty="0"/>
+              <a:t>Повнота</a:t>
+            </a:r>
+            <a:endParaRPr lang="uk-UA" dirty="0" smtClean="0"/>
+          </a:p>
+          <a:p>
+            <a:pPr marL="914400" lvl="1" indent="-514350"/>
+            <a:r>
+              <a:rPr lang="uk-UA" dirty="0" smtClean="0"/>
+              <a:t>…</a:t>
+            </a:r>
+          </a:p>
+          <a:p>
+            <a:pPr marL="514350" indent="-514350">
+              <a:buFont typeface="+mj-lt"/>
+              <a:buAutoNum type="arabicPeriod"/>
+            </a:pPr>
+            <a:endParaRPr lang="uk-UA" dirty="0" smtClean="0"/>
           </a:p>
         </p:txBody>
       </p:sp>
@@ -4410,6 +4362,13 @@
   <p:clrMapOvr>
     <a:masterClrMapping/>
   </p:clrMapOvr>
+  <p:timing>
+    <p:tnLst>
+      <p:par>
+        <p:cTn id="1" dur="indefinite" restart="never" nodeType="tmRoot"/>
+      </p:par>
+    </p:tnLst>
+  </p:timing>
 </p:sld>
 </file>
 
@@ -4447,7 +4406,11 @@
           <a:p>
             <a:r>
               <a:rPr lang="uk-UA" dirty="0" smtClean="0"/>
-              <a:t>Невдалі назви</a:t>
+              <a:t>Звідки</a:t>
+            </a:r>
+            <a:r>
+              <a:rPr lang="uk-UA" baseline="0" dirty="0" smtClean="0"/>
+              <a:t> береться поганий код?</a:t>
             </a:r>
             <a:endParaRPr lang="uk-UA" dirty="0"/>
           </a:p>
@@ -4470,113 +4433,8 @@
           <a:p>
             <a:r>
               <a:rPr lang="uk-UA" dirty="0" smtClean="0"/>
-              <a:t>Схожі назви, які не передають різницю призначення (</a:t>
-            </a:r>
-            <a:r>
-              <a:rPr lang="uk-UA" strike="sngStrike" dirty="0" err="1" smtClean="0"/>
-              <a:t>user</a:t>
-            </a:r>
-            <a:r>
-              <a:rPr lang="uk-UA" strike="sngStrike" dirty="0" smtClean="0"/>
-              <a:t>, </a:t>
-            </a:r>
-            <a:r>
-              <a:rPr lang="uk-UA" strike="sngStrike" dirty="0" err="1" smtClean="0"/>
-              <a:t>userInfo</a:t>
-            </a:r>
-            <a:r>
-              <a:rPr lang="uk-UA" dirty="0" smtClean="0"/>
-              <a:t>,  </a:t>
-            </a:r>
-            <a:r>
-              <a:rPr lang="uk-UA" strike="sngStrike" dirty="0" err="1" smtClean="0"/>
-              <a:t>report</a:t>
-            </a:r>
-            <a:r>
-              <a:rPr lang="uk-UA" strike="sngStrike" dirty="0" smtClean="0"/>
-              <a:t>, </a:t>
-            </a:r>
-            <a:r>
-              <a:rPr lang="uk-UA" strike="sngStrike" dirty="0" err="1" smtClean="0"/>
-              <a:t>reportData</a:t>
-            </a:r>
-            <a:r>
-              <a:rPr lang="uk-UA" dirty="0" smtClean="0"/>
-              <a:t>)</a:t>
-            </a:r>
-          </a:p>
-          <a:p>
-            <a:r>
-              <a:rPr lang="uk-UA" dirty="0" smtClean="0"/>
-              <a:t>Назва типу у змінній коли це і так зрозуміло (</a:t>
-            </a:r>
-            <a:r>
-              <a:rPr lang="uk-UA" strike="sngStrike" dirty="0" err="1" smtClean="0"/>
-              <a:t>reportObject</a:t>
-            </a:r>
-            <a:r>
-              <a:rPr lang="uk-UA" strike="sngStrike" dirty="0" smtClean="0"/>
-              <a:t>, </a:t>
-            </a:r>
-            <a:r>
-              <a:rPr lang="uk-UA" strike="sngStrike" dirty="0" err="1" smtClean="0"/>
-              <a:t>descriptionText</a:t>
-            </a:r>
-            <a:r>
-              <a:rPr lang="uk-UA" dirty="0" smtClean="0"/>
-              <a:t>)</a:t>
-            </a:r>
-          </a:p>
-          <a:p>
-            <a:r>
-              <a:rPr lang="uk-UA" dirty="0" smtClean="0"/>
-              <a:t>Лишні префікси контексту</a:t>
-            </a:r>
-            <a:r>
-              <a:rPr lang="en-US" dirty="0" smtClean="0"/>
-              <a:t>. </a:t>
-            </a:r>
-            <a:r>
-              <a:rPr lang="ru-RU" dirty="0" err="1" smtClean="0"/>
-              <a:t>Наприклад</a:t>
-            </a:r>
-            <a:r>
-              <a:rPr lang="ru-RU" dirty="0" smtClean="0"/>
-              <a:t> </a:t>
-            </a:r>
-            <a:r>
-              <a:rPr lang="ru-RU" dirty="0" err="1" smtClean="0"/>
-              <a:t>назва</a:t>
-            </a:r>
-            <a:r>
-              <a:rPr lang="ru-RU" dirty="0" smtClean="0"/>
-              <a:t> </a:t>
-            </a:r>
-            <a:r>
-              <a:rPr lang="ru-RU" dirty="0" err="1" smtClean="0"/>
-              <a:t>аплікації</a:t>
-            </a:r>
-            <a:r>
-              <a:rPr lang="ru-RU" dirty="0" smtClean="0"/>
-              <a:t> перед </a:t>
-            </a:r>
-            <a:r>
-              <a:rPr lang="ru-RU" dirty="0" err="1" smtClean="0"/>
-              <a:t>назвою</a:t>
-            </a:r>
-            <a:r>
-              <a:rPr lang="ru-RU" dirty="0" smtClean="0"/>
-              <a:t> </a:t>
-            </a:r>
-            <a:r>
-              <a:rPr lang="ru-RU" dirty="0" err="1" smtClean="0"/>
-              <a:t>класів</a:t>
-            </a:r>
-            <a:r>
-              <a:rPr lang="ru-RU" dirty="0" smtClean="0"/>
-              <a:t>.</a:t>
-            </a:r>
-            <a:endParaRPr lang="uk-UA" dirty="0" smtClean="0"/>
+              <a:t>Поганий код з'являється тоді коли в ньому відсутні характеристики хорошого коду  </a:t>
+            </a:r>
           </a:p>
         </p:txBody>
       </p:sp>
@@ -4585,6 +4443,13 @@
   <p:clrMapOvr>
     <a:masterClrMapping/>
   </p:clrMapOvr>
+  <p:timing>
+    <p:tnLst>
+      <p:par>
+        <p:cTn id="1" dur="indefinite" restart="never" nodeType="tmRoot"/>
+      </p:par>
+    </p:tnLst>
+  </p:timing>
 </p:sld>
 </file>
 
@@ -4607,6 +4472,57 @@
       </p:grpSpPr>
       <p:sp>
         <p:nvSpPr>
+          <p:cNvPr id="3" name="Содержимое 2"/>
+          <p:cNvSpPr>
+            <a:spLocks noGrp="1"/>
+          </p:cNvSpPr>
+          <p:nvPr>
+            <p:ph idx="1"/>
+          </p:nvPr>
+        </p:nvSpPr>
+        <p:spPr/>
+        <p:txBody>
+          <a:bodyPr/>
+          <a:lstStyle/>
+          <a:p>
+            <a:r>
+              <a:rPr lang="uk-UA" b="1" dirty="0" smtClean="0"/>
+              <a:t>Від вищого рівня абстракції до нижчого</a:t>
+            </a:r>
+          </a:p>
+          <a:p>
+            <a:r>
+              <a:rPr lang="uk-UA" b="1" dirty="0" smtClean="0"/>
+              <a:t>Одна мета (призначення) – один рівень абстракції – один </a:t>
+            </a:r>
+            <a:r>
+              <a:rPr lang="ru-RU" b="1" dirty="0" smtClean="0"/>
+              <a:t>контекст</a:t>
+            </a:r>
+            <a:r>
+              <a:rPr lang="uk-UA" sz="2800" dirty="0" smtClean="0"/>
+              <a:t>(за винятком допоміжних конструкцій з тимчасовими змінними)</a:t>
+            </a:r>
+          </a:p>
+          <a:p>
+            <a:r>
+              <a:rPr lang="uk-UA" b="1" dirty="0"/>
+              <a:t>П</a:t>
+            </a:r>
+            <a:r>
+              <a:rPr lang="uk-UA" b="1" dirty="0" smtClean="0"/>
+              <a:t>росто і </a:t>
+            </a:r>
+            <a:r>
+              <a:rPr lang="uk-UA" b="1" dirty="0" smtClean="0"/>
+              <a:t>очевидно (для даного контексту)</a:t>
+            </a:r>
+            <a:endParaRPr lang="uk-UA" b="1" dirty="0" smtClean="0"/>
+          </a:p>
+        </p:txBody>
+      </p:sp>
+      <p:sp>
+        <p:nvSpPr>
           <p:cNvPr id="2" name="Заголовок 1"/>
           <p:cNvSpPr>
             <a:spLocks noGrp="1"/>
@@ -4617,17 +4533,74 @@
         </p:nvSpPr>
         <p:spPr/>
         <p:txBody>
-          <a:bodyPr/>
+          <a:bodyPr>
+            <a:normAutofit/>
+          </a:bodyPr>
           <a:lstStyle/>
           <a:p>
             <a:r>
               <a:rPr lang="uk-UA" dirty="0" smtClean="0"/>
-              <a:t>Дерево проекту</a:t>
+              <a:t>Кодування має бути природнім</a:t>
             </a:r>
             <a:endParaRPr lang="uk-UA" dirty="0"/>
           </a:p>
         </p:txBody>
       </p:sp>
+    </p:spTree>
+  </p:cSld>
+  <p:clrMapOvr>
+    <a:masterClrMapping/>
+  </p:clrMapOvr>
+  <p:timing>
+    <p:tnLst>
+      <p:par>
+        <p:cTn id="1" dur="indefinite" restart="never" nodeType="tmRoot"/>
+      </p:par>
+    </p:tnLst>
+  </p:timing>
+</p:sld>
+</file>
+
+<file path=ppt/slides/slide13.xml><?xml version="1.0" encoding="utf-8"?>
+<p:sld xmlns:a="http://schemas.openxmlformats.org/drawingml/2006/main" xmlns:r="http://schemas.openxmlformats.org/officeDocument/2006/relationships" xmlns:p="http://schemas.openxmlformats.org/presentationml/2006/main">
+  <p:cSld>
+    <p:spTree>
+      <p:nvGrpSpPr>
+        <p:cNvPr id="1" name=""/>
+        <p:cNvGrpSpPr/>
+        <p:nvPr/>
+      </p:nvGrpSpPr>
+      <p:grpSpPr>
+        <a:xfrm>
+          <a:off x="0" y="0"/>
+          <a:ext cx="0" cy="0"/>
+          <a:chOff x="0" y="0"/>
+          <a:chExt cx="0" cy="0"/>
+        </a:xfrm>
+      </p:grpSpPr>
+      <p:sp>
+        <p:nvSpPr>
+          <p:cNvPr id="2" name="Заголовок 1"/>
+          <p:cNvSpPr>
+            <a:spLocks noGrp="1"/>
+          </p:cNvSpPr>
+          <p:nvPr>
+            <p:ph type="title"/>
+          </p:nvPr>
+        </p:nvSpPr>
+        <p:spPr/>
+        <p:txBody>
+          <a:bodyPr/>
+          <a:lstStyle/>
+          <a:p>
+            <a:r>
+              <a:rPr lang="uk-UA" dirty="0" smtClean="0"/>
+              <a:t>Виробництво (створення) коду</a:t>
+            </a:r>
+            <a:endParaRPr lang="uk-UA" dirty="0"/>
+          </a:p>
+        </p:txBody>
+      </p:sp>
       <p:sp>
         <p:nvSpPr>
           <p:cNvPr id="3" name="Содержимое 2"/>
@@ -4636,26 +4609,250 @@
           </p:cNvSpPr>
           <p:nvPr>
             <p:ph idx="1"/>
+          </p:nvPr>
+        </p:nvSpPr>
+        <p:spPr/>
+        <p:txBody>
+          <a:bodyPr>
+            <a:normAutofit/>
+          </a:bodyPr>
+          <a:lstStyle/>
+          <a:p>
+            <a:pPr marL="514350" indent="-514350">
+              <a:buFont typeface="+mj-lt"/>
+              <a:buAutoNum type="arabicPeriod"/>
+            </a:pPr>
+            <a:r>
+              <a:rPr lang="uk-UA" dirty="0" smtClean="0"/>
+              <a:t>Визначення мети. </a:t>
+            </a:r>
+          </a:p>
+          <a:p>
+            <a:pPr marL="514350" indent="-514350">
+              <a:buFont typeface="+mj-lt"/>
+              <a:buAutoNum type="arabicPeriod"/>
+            </a:pPr>
+            <a:r>
+              <a:rPr lang="uk-UA" dirty="0" smtClean="0"/>
+              <a:t>Визначення кроків досягнення мети з найменшим рівнем деталізації. Якщо немає меншого рівня деталізації то написати відповідний код, інакше почати з пункту 1.</a:t>
+            </a:r>
+          </a:p>
+        </p:txBody>
+      </p:sp>
+    </p:spTree>
+  </p:cSld>
+  <p:clrMapOvr>
+    <a:masterClrMapping/>
+  </p:clrMapOvr>
+  <p:timing>
+    <p:tnLst>
+      <p:par>
+        <p:cTn id="1" dur="indefinite" restart="never" nodeType="tmRoot"/>
+      </p:par>
+    </p:tnLst>
+  </p:timing>
+</p:sld>
+</file>
+
+<file path=ppt/slides/slide14.xml><?xml version="1.0" encoding="utf-8"?>
+<p:sld xmlns:a="http://schemas.openxmlformats.org/drawingml/2006/main" xmlns:r="http://schemas.openxmlformats.org/officeDocument/2006/relationships" xmlns:p="http://schemas.openxmlformats.org/presentationml/2006/main">
+  <p:cSld>
+    <p:spTree>
+      <p:nvGrpSpPr>
+        <p:cNvPr id="1" name=""/>
+        <p:cNvGrpSpPr/>
+        <p:nvPr/>
+      </p:nvGrpSpPr>
+      <p:grpSpPr>
+        <a:xfrm>
+          <a:off x="0" y="0"/>
+          <a:ext cx="0" cy="0"/>
+          <a:chOff x="0" y="0"/>
+          <a:chExt cx="0" cy="0"/>
+        </a:xfrm>
+      </p:grpSpPr>
+      <p:sp>
+        <p:nvSpPr>
+          <p:cNvPr id="2" name="Заголовок 1"/>
+          <p:cNvSpPr>
+            <a:spLocks noGrp="1"/>
+          </p:cNvSpPr>
+          <p:nvPr>
+            <p:ph type="title"/>
           </p:nvPr>
         </p:nvSpPr>
         <p:spPr>
           <a:xfrm>
-            <a:off x="467544" y="2636912"/>
-            <a:ext cx="8229600" cy="4032448"/>
+            <a:off x="395536" y="2060848"/>
+            <a:ext cx="8229600" cy="1143000"/>
           </a:xfrm>
         </p:spPr>
-        <p:style>
-          <a:lnRef idx="0">
-            <a:scrgbClr r="0" g="0" b="0"/>
-          </a:lnRef>
-          <a:fillRef idx="1001">
-            <a:schemeClr val="lt2"/>
-          </a:fillRef>
-          <a:effectRef idx="0">
-            <a:scrgbClr r="0" g="0" b="0"/>
-          </a:effectRef>
-          <a:fontRef idx="major"/>
-        </p:style>
+        <p:txBody>
+          <a:bodyPr>
+            <a:normAutofit/>
+          </a:bodyPr>
+          <a:lstStyle/>
+          <a:p>
+            <a:r>
+              <a:rPr lang="uk-UA" b="1" dirty="0" smtClean="0"/>
+              <a:t>Поганий і НЕ поганий код</a:t>
+            </a:r>
+            <a:endParaRPr lang="uk-UA" b="1" dirty="0"/>
+          </a:p>
+        </p:txBody>
+      </p:sp>
+    </p:spTree>
+  </p:cSld>
+  <p:clrMapOvr>
+    <a:masterClrMapping/>
+  </p:clrMapOvr>
+  <p:timing>
+    <p:tnLst>
+      <p:par>
+        <p:cTn id="1" dur="indefinite" restart="never" nodeType="tmRoot"/>
+      </p:par>
+    </p:tnLst>
+  </p:timing>
+</p:sld>
+</file>
+
+<file path=ppt/slides/slide15.xml><?xml version="1.0" encoding="utf-8"?>
+<p:sld xmlns:a="http://schemas.openxmlformats.org/drawingml/2006/main" xmlns:r="http://schemas.openxmlformats.org/officeDocument/2006/relationships" xmlns:p="http://schemas.openxmlformats.org/presentationml/2006/main">
+  <p:cSld>
+    <p:spTree>
+      <p:nvGrpSpPr>
+        <p:cNvPr id="1" name=""/>
+        <p:cNvGrpSpPr/>
+        <p:nvPr/>
+      </p:nvGrpSpPr>
+      <p:grpSpPr>
+        <a:xfrm>
+          <a:off x="0" y="0"/>
+          <a:ext cx="0" cy="0"/>
+          <a:chOff x="0" y="0"/>
+          <a:chExt cx="0" cy="0"/>
+        </a:xfrm>
+      </p:grpSpPr>
+      <p:sp>
+        <p:nvSpPr>
+          <p:cNvPr id="2" name="Title 1"/>
+          <p:cNvSpPr>
+            <a:spLocks noGrp="1"/>
+          </p:cNvSpPr>
+          <p:nvPr>
+            <p:ph type="title"/>
+          </p:nvPr>
+        </p:nvSpPr>
+        <p:spPr/>
+        <p:txBody>
+          <a:bodyPr/>
+          <a:lstStyle/>
+          <a:p>
+            <a:r>
+              <a:rPr lang="uk-UA" dirty="0" smtClean="0"/>
+              <a:t>Функція</a:t>
+            </a:r>
+            <a:endParaRPr lang="uk-UA" dirty="0"/>
+          </a:p>
+        </p:txBody>
+      </p:sp>
+      <p:sp>
+        <p:nvSpPr>
+          <p:cNvPr id="3" name="Content Placeholder 2"/>
+          <p:cNvSpPr>
+            <a:spLocks noGrp="1"/>
+          </p:cNvSpPr>
+          <p:nvPr>
+            <p:ph idx="1"/>
+          </p:nvPr>
+        </p:nvSpPr>
+        <p:spPr/>
+        <p:txBody>
+          <a:bodyPr/>
+          <a:lstStyle/>
+          <a:p>
+            <a:pPr marL="742950" indent="-742950">
+              <a:buFont typeface="+mj-lt"/>
+              <a:buAutoNum type="arabicPeriod"/>
+            </a:pPr>
+            <a:r>
+              <a:rPr lang="uk-UA" sz="3600" b="1" dirty="0"/>
+              <a:t>Функція створюється для виконання однієї задачі в якомусь </a:t>
+            </a:r>
+            <a:r>
+              <a:rPr lang="uk-UA" sz="3600" b="1" dirty="0" smtClean="0"/>
+              <a:t>контексті</a:t>
+            </a:r>
+            <a:endParaRPr lang="uk-UA" sz="3600" b="1" dirty="0"/>
+          </a:p>
+        </p:txBody>
+      </p:sp>
+    </p:spTree>
+    <p:extLst>
+      <p:ext uri="{BB962C8B-B14F-4D97-AF65-F5344CB8AC3E}">
+        <p14:creationId xmlns="" xmlns:p14="http://schemas.microsoft.com/office/powerpoint/2010/main" val="4004276355"/>
+      </p:ext>
+    </p:extLst>
+  </p:cSld>
+  <p:clrMapOvr>
+    <a:masterClrMapping/>
+  </p:clrMapOvr>
+</p:sld>
+</file>
+
+<file path=ppt/slides/slide16.xml><?xml version="1.0" encoding="utf-8"?>
+<p:sld xmlns:a="http://schemas.openxmlformats.org/drawingml/2006/main" xmlns:r="http://schemas.openxmlformats.org/officeDocument/2006/relationships" xmlns:p="http://schemas.openxmlformats.org/presentationml/2006/main">
+  <p:cSld>
+    <p:spTree>
+      <p:nvGrpSpPr>
+        <p:cNvPr id="1" name=""/>
+        <p:cNvGrpSpPr/>
+        <p:nvPr/>
+      </p:nvGrpSpPr>
+      <p:grpSpPr>
+        <a:xfrm>
+          <a:off x="0" y="0"/>
+          <a:ext cx="0" cy="0"/>
+          <a:chOff x="0" y="0"/>
+          <a:chExt cx="0" cy="0"/>
+        </a:xfrm>
+      </p:grpSpPr>
+      <p:sp>
+        <p:nvSpPr>
+          <p:cNvPr id="2" name="Title 1"/>
+          <p:cNvSpPr>
+            <a:spLocks noGrp="1"/>
+          </p:cNvSpPr>
+          <p:nvPr>
+            <p:ph type="title"/>
+          </p:nvPr>
+        </p:nvSpPr>
+        <p:spPr/>
+        <p:txBody>
+          <a:bodyPr>
+            <a:normAutofit/>
+          </a:bodyPr>
+          <a:lstStyle/>
+          <a:p>
+            <a:r>
+              <a:rPr lang="uk-UA" dirty="0" smtClean="0"/>
+              <a:t>Інтерфейс функції</a:t>
+            </a:r>
+            <a:endParaRPr lang="uk-UA" dirty="0"/>
+          </a:p>
+        </p:txBody>
+      </p:sp>
+      <p:sp>
+        <p:nvSpPr>
+          <p:cNvPr id="3" name="Content Placeholder 2"/>
+          <p:cNvSpPr>
+            <a:spLocks noGrp="1"/>
+          </p:cNvSpPr>
+          <p:nvPr>
+            <p:ph idx="1"/>
+          </p:nvPr>
+        </p:nvSpPr>
+        <p:spPr/>
         <p:txBody>
           <a:bodyPr>
             <a:normAutofit fontScale="92500" lnSpcReduction="10000"/>
@@ -4663,280 +4860,571 @@
           <a:lstStyle/>
           <a:p>
             <a:r>
-              <a:rPr lang="en-US" sz="2400" dirty="0" smtClean="0"/>
-              <a:t>Services</a:t>
-            </a:r>
-          </a:p>
-          <a:p>
-            <a:pPr lvl="1">
-              <a:buFont typeface="Arial" pitchFamily="34" charset="0"/>
-              <a:buChar char="•"/>
+              <a:rPr lang="uk-UA" dirty="0" smtClean="0"/>
+              <a:t>Дієслово (</a:t>
+            </a:r>
+            <a:r>
+              <a:rPr lang="en-US" dirty="0" smtClean="0"/>
+              <a:t>Run, Start, Connect</a:t>
+            </a:r>
+            <a:r>
+              <a:rPr lang="uk-UA" dirty="0" smtClean="0"/>
+              <a:t>)</a:t>
+            </a:r>
+          </a:p>
+          <a:p>
+            <a:r>
+              <a:rPr lang="uk-UA" dirty="0" smtClean="0"/>
+              <a:t>Дієслово + сутність</a:t>
+            </a:r>
+            <a:r>
+              <a:rPr lang="en-US" dirty="0" smtClean="0"/>
+              <a:t> (</a:t>
+            </a:r>
+            <a:r>
+              <a:rPr lang="en-US" dirty="0" err="1" smtClean="0"/>
+              <a:t>SaveReport</a:t>
+            </a:r>
+            <a:r>
+              <a:rPr lang="en-US" dirty="0" smtClean="0"/>
+              <a:t>, </a:t>
+            </a:r>
+            <a:r>
+              <a:rPr lang="en-US" dirty="0" err="1" smtClean="0"/>
+              <a:t>CalculateSalary</a:t>
+            </a:r>
+            <a:r>
+              <a:rPr lang="en-US" dirty="0" smtClean="0"/>
+              <a:t>)</a:t>
+            </a:r>
+            <a:endParaRPr lang="uk-UA" dirty="0" smtClean="0"/>
+          </a:p>
+          <a:p>
+            <a:r>
+              <a:rPr lang="uk-UA" dirty="0" smtClean="0"/>
+              <a:t>Дієслово + уточнення</a:t>
+            </a:r>
+            <a:r>
+              <a:rPr lang="ru-RU" dirty="0" smtClean="0"/>
+              <a:t> + </a:t>
+            </a:r>
+            <a:r>
+              <a:rPr lang="uk-UA" dirty="0" smtClean="0"/>
+              <a:t>сутність</a:t>
+            </a:r>
+            <a:r>
+              <a:rPr lang="en-US" dirty="0" smtClean="0"/>
+              <a:t> (</a:t>
+            </a:r>
+            <a:r>
+              <a:rPr lang="en-US" dirty="0" err="1" smtClean="0"/>
+              <a:t>RemoveSelectedReports</a:t>
+            </a:r>
+            <a:r>
+              <a:rPr lang="en-US" dirty="0" smtClean="0"/>
+              <a:t>, </a:t>
+            </a:r>
+            <a:r>
+              <a:rPr lang="en-US" dirty="0" err="1" smtClean="0"/>
+              <a:t>RefreshStaleData</a:t>
+            </a:r>
+            <a:r>
+              <a:rPr lang="en-US" dirty="0" smtClean="0"/>
+              <a:t>)</a:t>
+            </a:r>
+            <a:endParaRPr lang="uk-UA" dirty="0" smtClean="0"/>
+          </a:p>
+          <a:p>
+            <a:r>
+              <a:rPr lang="uk-UA" dirty="0" smtClean="0"/>
+              <a:t>Довгі назви це непогано, погано – незрозумілі назви</a:t>
+            </a:r>
+          </a:p>
+          <a:p>
+            <a:pPr algn="ctr">
+              <a:buNone/>
             </a:pPr>
             <a:r>
-              <a:rPr lang="en-US" sz="2000" dirty="0" smtClean="0"/>
-              <a:t>Implementation</a:t>
-            </a:r>
-          </a:p>
-          <a:p>
-            <a:pPr lvl="2"/>
-            <a:r>
-              <a:rPr lang="en-US" sz="1600" dirty="0" err="1" smtClean="0"/>
-              <a:t>LogerService.cs</a:t>
-            </a:r>
-            <a:endParaRPr lang="en-US" sz="1600" dirty="0" smtClean="0"/>
-          </a:p>
-          <a:p>
-            <a:pPr lvl="2"/>
-            <a:r>
-              <a:rPr lang="en-US" sz="1600" dirty="0" err="1" smtClean="0"/>
-              <a:t>SecurityService.cs</a:t>
-            </a:r>
-            <a:endParaRPr lang="en-US" sz="1200" dirty="0" smtClean="0"/>
-          </a:p>
-          <a:p>
-            <a:pPr lvl="1">
-              <a:buFont typeface="Arial" pitchFamily="34" charset="0"/>
-              <a:buChar char="•"/>
-            </a:pPr>
-            <a:r>
-              <a:rPr lang="en-US" sz="2000" dirty="0" err="1" smtClean="0"/>
-              <a:t>ILoggerService.cs</a:t>
-            </a:r>
-            <a:endParaRPr lang="en-US" sz="2000" dirty="0" smtClean="0"/>
-          </a:p>
-          <a:p>
-            <a:pPr lvl="1">
-              <a:buFont typeface="Arial" pitchFamily="34" charset="0"/>
-              <a:buChar char="•"/>
-            </a:pPr>
-            <a:r>
-              <a:rPr lang="en-US" sz="2000" dirty="0" err="1" smtClean="0"/>
-              <a:t>ISecurityService.cs</a:t>
-            </a:r>
-            <a:endParaRPr lang="uk-UA" sz="2000" dirty="0" smtClean="0"/>
-          </a:p>
-          <a:p>
-            <a:r>
-              <a:rPr lang="en-US" sz="2400" dirty="0" smtClean="0"/>
-              <a:t>Views</a:t>
-            </a:r>
-          </a:p>
-          <a:p>
-            <a:pPr lvl="1">
-              <a:buFont typeface="Arial" pitchFamily="34" charset="0"/>
-              <a:buChar char="•"/>
-            </a:pPr>
-            <a:r>
-              <a:rPr lang="en-US" sz="2000" dirty="0" smtClean="0"/>
-              <a:t>CreateUser.html</a:t>
-            </a:r>
-          </a:p>
-          <a:p>
-            <a:pPr lvl="1">
-              <a:buFont typeface="Arial" pitchFamily="34" charset="0"/>
-              <a:buChar char="•"/>
-            </a:pPr>
-            <a:r>
-              <a:rPr lang="en-US" sz="2000" dirty="0" smtClean="0"/>
-              <a:t>EditUser.html</a:t>
-            </a:r>
-          </a:p>
-          <a:p>
-            <a:r>
-              <a:rPr lang="en-US" sz="2400" dirty="0" smtClean="0"/>
-              <a:t>Controllers</a:t>
-            </a:r>
-          </a:p>
-          <a:p>
-            <a:r>
-              <a:rPr lang="en-US" sz="2400" dirty="0" smtClean="0"/>
-              <a:t>Models</a:t>
-            </a:r>
-          </a:p>
-          <a:p>
-            <a:r>
-              <a:rPr lang="en-US" sz="2400" dirty="0" err="1" smtClean="0"/>
-              <a:t>Utils</a:t>
-            </a:r>
-            <a:endParaRPr lang="ru-RU" sz="2400" dirty="0" smtClean="0"/>
-          </a:p>
-        </p:txBody>
-      </p:sp>
-      <p:sp>
-        <p:nvSpPr>
-          <p:cNvPr id="4" name="Содержимое 2"/>
-          <p:cNvSpPr txBox="1">
-            <a:spLocks/>
-          </p:cNvSpPr>
-          <p:nvPr/>
-        </p:nvSpPr>
-        <p:spPr>
-          <a:xfrm>
-            <a:off x="611560" y="1412776"/>
-            <a:ext cx="8229600" cy="1180727"/>
-          </a:xfrm>
-          <a:prstGeom prst="rect">
-            <a:avLst/>
-          </a:prstGeom>
-        </p:spPr>
-        <p:txBody>
-          <a:bodyPr vert="horz" lIns="91440" tIns="45720" rIns="91440" bIns="45720" rtlCol="0">
+              <a:rPr lang="uk-UA" b="1" dirty="0" smtClean="0"/>
+              <a:t>Хороша назва функції, показує,</a:t>
+            </a:r>
+            <a:r>
+              <a:rPr lang="en-US" b="1" dirty="0" smtClean="0"/>
+              <a:t> </a:t>
+            </a:r>
+            <a:r>
+              <a:rPr lang="ru-RU" b="1" dirty="0" smtClean="0"/>
+              <a:t>що</a:t>
+            </a:r>
+            <a:r>
+              <a:rPr lang="uk-UA" b="1" dirty="0" smtClean="0"/>
+              <a:t> робить функція без необхідності дивитись на сигнатуру.</a:t>
+            </a:r>
+          </a:p>
+        </p:txBody>
+      </p:sp>
+    </p:spTree>
+    <p:extLst>
+      <p:ext uri="{BB962C8B-B14F-4D97-AF65-F5344CB8AC3E}">
+        <p14:creationId xmlns="" xmlns:p14="http://schemas.microsoft.com/office/powerpoint/2010/main" val="2336217352"/>
+      </p:ext>
+    </p:extLst>
+  </p:cSld>
+  <p:clrMapOvr>
+    <a:masterClrMapping/>
+  </p:clrMapOvr>
+</p:sld>
+</file>
+
+<file path=ppt/slides/slide17.xml><?xml version="1.0" encoding="utf-8"?>
+<p:sld xmlns:a="http://schemas.openxmlformats.org/drawingml/2006/main" xmlns:r="http://schemas.openxmlformats.org/officeDocument/2006/relationships" xmlns:p="http://schemas.openxmlformats.org/presentationml/2006/main">
+  <p:cSld>
+    <p:spTree>
+      <p:nvGrpSpPr>
+        <p:cNvPr id="1" name=""/>
+        <p:cNvGrpSpPr/>
+        <p:nvPr/>
+      </p:nvGrpSpPr>
+      <p:grpSpPr>
+        <a:xfrm>
+          <a:off x="0" y="0"/>
+          <a:ext cx="0" cy="0"/>
+          <a:chOff x="0" y="0"/>
+          <a:chExt cx="0" cy="0"/>
+        </a:xfrm>
+      </p:grpSpPr>
+      <p:sp>
+        <p:nvSpPr>
+          <p:cNvPr id="2" name="Title 1"/>
+          <p:cNvSpPr>
+            <a:spLocks noGrp="1"/>
+          </p:cNvSpPr>
+          <p:nvPr>
+            <p:ph type="title"/>
+          </p:nvPr>
+        </p:nvSpPr>
+        <p:spPr/>
+        <p:txBody>
+          <a:bodyPr/>
+          <a:lstStyle/>
+          <a:p>
+            <a:r>
+              <a:rPr lang="uk-UA" dirty="0" smtClean="0"/>
+              <a:t>Реалізація функції</a:t>
+            </a:r>
+            <a:endParaRPr lang="uk-UA" dirty="0"/>
+          </a:p>
+        </p:txBody>
+      </p:sp>
+      <p:sp>
+        <p:nvSpPr>
+          <p:cNvPr id="3" name="Content Placeholder 2"/>
+          <p:cNvSpPr>
+            <a:spLocks noGrp="1"/>
+          </p:cNvSpPr>
+          <p:nvPr>
+            <p:ph idx="1"/>
+          </p:nvPr>
+        </p:nvSpPr>
+        <p:spPr/>
+        <p:txBody>
+          <a:bodyPr>
             <a:normAutofit/>
           </a:bodyPr>
           <a:lstStyle/>
           <a:p>
-            <a:pPr marL="342900" marR="0" lvl="0" indent="-342900" algn="l" defTabSz="914400" rtl="0" eaLnBrk="1" fontAlgn="auto" latinLnBrk="0" hangingPunct="1">
-              <a:lnSpc>
-                <a:spcPct val="100000"/>
-              </a:lnSpc>
-              <a:spcBef>
-                <a:spcPct val="20000"/>
-              </a:spcBef>
-              <a:spcAft>
-                <a:spcPts val="0"/>
-              </a:spcAft>
-              <a:buClrTx/>
-              <a:buSzTx/>
-              <a:buFont typeface="Arial" pitchFamily="34" charset="0"/>
-              <a:buChar char="•"/>
-              <a:tabLst/>
-              <a:defRPr/>
+            <a:r>
+              <a:rPr lang="uk-UA" b="1" dirty="0" smtClean="0"/>
+              <a:t>Один рівень абстракції</a:t>
+            </a:r>
+          </a:p>
+          <a:p>
+            <a:r>
+              <a:rPr lang="uk-UA" b="1" dirty="0" smtClean="0"/>
+              <a:t>Послідовність дій</a:t>
+            </a:r>
+          </a:p>
+          <a:p>
+            <a:r>
+              <a:rPr lang="uk-UA" b="1" dirty="0" smtClean="0"/>
+              <a:t>Все в реалзіації функції має служити безпосередньо поставленій задачі</a:t>
+            </a:r>
+          </a:p>
+          <a:p>
+            <a:pPr marL="971550" lvl="1" indent="-514350">
+              <a:buFont typeface="+mj-lt"/>
+              <a:buAutoNum type="arabicPeriod"/>
             </a:pPr>
-            <a:r>
-              <a:rPr kumimoji="0" lang="uk-UA" sz="2800" b="0" i="0" u="none" strike="noStrike" kern="1200" cap="none" spc="0" normalizeH="0" baseline="0" noProof="0" dirty="0" smtClean="0">
-                <a:ln>
-                  <a:noFill/>
-                </a:ln>
-                <a:solidFill>
-                  <a:schemeClr val="tx1"/>
-                </a:solidFill>
-                <a:effectLst/>
-                <a:uLnTx/>
-                <a:uFillTx/>
-                <a:latin typeface="+mn-lt"/>
-                <a:ea typeface="+mn-ea"/>
-                <a:cs typeface="+mn-cs"/>
-              </a:rPr>
-              <a:t>По осі </a:t>
-            </a:r>
-            <a:r>
-              <a:rPr kumimoji="0" lang="en-US" sz="2800" b="0" i="0" u="none" strike="noStrike" kern="1200" cap="none" spc="0" normalizeH="0" baseline="0" noProof="0" dirty="0" smtClean="0">
-                <a:ln>
-                  <a:noFill/>
-                </a:ln>
-                <a:solidFill>
-                  <a:schemeClr val="tx1"/>
-                </a:solidFill>
-                <a:effectLst/>
-                <a:uLnTx/>
-                <a:uFillTx/>
-                <a:latin typeface="+mn-lt"/>
-                <a:ea typeface="+mn-ea"/>
-                <a:cs typeface="+mn-cs"/>
-              </a:rPr>
-              <a:t>Y – </a:t>
-            </a:r>
-            <a:r>
-              <a:rPr kumimoji="0" lang="uk-UA" sz="2800" b="0" i="0" u="none" strike="noStrike" kern="1200" cap="none" spc="0" normalizeH="0" baseline="0" noProof="0" dirty="0" smtClean="0">
-                <a:ln>
-                  <a:noFill/>
-                </a:ln>
-                <a:solidFill>
-                  <a:schemeClr val="tx1"/>
-                </a:solidFill>
-                <a:effectLst/>
-                <a:uLnTx/>
-                <a:uFillTx/>
-                <a:latin typeface="+mn-lt"/>
-                <a:ea typeface="+mn-ea"/>
-                <a:cs typeface="+mn-cs"/>
-              </a:rPr>
-              <a:t>призначення</a:t>
-            </a:r>
-          </a:p>
-          <a:p>
-            <a:pPr marL="342900" marR="0" lvl="0" indent="-342900" algn="l" defTabSz="914400" rtl="0" eaLnBrk="1" fontAlgn="auto" latinLnBrk="0" hangingPunct="1">
-              <a:lnSpc>
-                <a:spcPct val="100000"/>
-              </a:lnSpc>
-              <a:spcBef>
-                <a:spcPct val="20000"/>
-              </a:spcBef>
-              <a:spcAft>
-                <a:spcPts val="0"/>
-              </a:spcAft>
-              <a:buClrTx/>
-              <a:buSzTx/>
-              <a:buFont typeface="Arial" pitchFamily="34" charset="0"/>
-              <a:buChar char="•"/>
-              <a:tabLst/>
-              <a:defRPr/>
-            </a:pPr>
-            <a:r>
-              <a:rPr kumimoji="0" lang="uk-UA" sz="2800" b="0" i="0" u="none" strike="noStrike" kern="1200" cap="none" spc="0" normalizeH="0" baseline="0" noProof="0" dirty="0" smtClean="0">
-                <a:ln>
-                  <a:noFill/>
-                </a:ln>
-                <a:solidFill>
-                  <a:schemeClr val="tx1"/>
-                </a:solidFill>
-                <a:effectLst/>
-                <a:uLnTx/>
-                <a:uFillTx/>
-                <a:latin typeface="+mn-lt"/>
-                <a:ea typeface="+mn-ea"/>
-                <a:cs typeface="+mn-cs"/>
-              </a:rPr>
-              <a:t>По осі </a:t>
-            </a:r>
-            <a:r>
-              <a:rPr kumimoji="0" lang="en-US" sz="2800" b="0" i="0" u="none" strike="noStrike" kern="1200" cap="none" spc="0" normalizeH="0" baseline="0" noProof="0" dirty="0" smtClean="0">
-                <a:ln>
-                  <a:noFill/>
-                </a:ln>
-                <a:solidFill>
-                  <a:schemeClr val="tx1"/>
-                </a:solidFill>
-                <a:effectLst/>
-                <a:uLnTx/>
-                <a:uFillTx/>
-                <a:latin typeface="+mn-lt"/>
-                <a:ea typeface="+mn-ea"/>
-                <a:cs typeface="+mn-cs"/>
-              </a:rPr>
-              <a:t>X – </a:t>
-            </a:r>
-            <a:r>
-              <a:rPr kumimoji="0" lang="uk-UA" sz="2800" b="0" i="0" u="none" strike="noStrike" kern="1200" cap="none" spc="0" normalizeH="0" baseline="0" noProof="0" dirty="0" smtClean="0">
-                <a:ln>
-                  <a:noFill/>
-                </a:ln>
-                <a:solidFill>
-                  <a:schemeClr val="tx1"/>
-                </a:solidFill>
-                <a:effectLst/>
-                <a:uLnTx/>
-                <a:uFillTx/>
-                <a:latin typeface="+mn-lt"/>
-                <a:ea typeface="+mn-ea"/>
-                <a:cs typeface="+mn-cs"/>
-              </a:rPr>
-              <a:t>рівень абстракції</a:t>
-            </a:r>
-            <a:endParaRPr kumimoji="0" lang="ru-RU" sz="2800" b="0" i="0" u="none" strike="noStrike" kern="1200" cap="none" spc="0" normalizeH="0" baseline="0" noProof="0" dirty="0" smtClean="0">
-              <a:ln>
-                <a:noFill/>
-              </a:ln>
-              <a:solidFill>
-                <a:schemeClr val="tx1"/>
-              </a:solidFill>
-              <a:effectLst/>
-              <a:uLnTx/>
-              <a:uFillTx/>
-              <a:latin typeface="+mn-lt"/>
-              <a:ea typeface="+mn-ea"/>
-              <a:cs typeface="+mn-cs"/>
-            </a:endParaRPr>
+            <a:endParaRPr lang="uk-UA" dirty="0" smtClean="0"/>
+          </a:p>
+        </p:txBody>
+      </p:sp>
+    </p:spTree>
+    <p:extLst>
+      <p:ext uri="{BB962C8B-B14F-4D97-AF65-F5344CB8AC3E}">
+        <p14:creationId xmlns="" xmlns:p14="http://schemas.microsoft.com/office/powerpoint/2010/main" val="940229710"/>
+      </p:ext>
+    </p:extLst>
+  </p:cSld>
+  <p:clrMapOvr>
+    <a:masterClrMapping/>
+  </p:clrMapOvr>
+</p:sld>
+</file>
+
+<file path=ppt/slides/slide18.xml><?xml version="1.0" encoding="utf-8"?>
+<p:sld xmlns:a="http://schemas.openxmlformats.org/drawingml/2006/main" xmlns:r="http://schemas.openxmlformats.org/officeDocument/2006/relationships" xmlns:p="http://schemas.openxmlformats.org/presentationml/2006/main">
+  <p:cSld>
+    <p:spTree>
+      <p:nvGrpSpPr>
+        <p:cNvPr id="1" name=""/>
+        <p:cNvGrpSpPr/>
+        <p:nvPr/>
+      </p:nvGrpSpPr>
+      <p:grpSpPr>
+        <a:xfrm>
+          <a:off x="0" y="0"/>
+          <a:ext cx="0" cy="0"/>
+          <a:chOff x="0" y="0"/>
+          <a:chExt cx="0" cy="0"/>
+        </a:xfrm>
+      </p:grpSpPr>
+      <p:sp>
+        <p:nvSpPr>
+          <p:cNvPr id="2" name="Заголовок 1"/>
+          <p:cNvSpPr>
+            <a:spLocks noGrp="1"/>
+          </p:cNvSpPr>
+          <p:nvPr>
+            <p:ph type="title"/>
+          </p:nvPr>
+        </p:nvSpPr>
+        <p:spPr/>
+        <p:txBody>
+          <a:bodyPr/>
+          <a:lstStyle/>
+          <a:p>
+            <a:r>
+              <a:rPr lang="uk-UA" dirty="0" smtClean="0"/>
+              <a:t>Назви змінних</a:t>
+            </a:r>
+            <a:endParaRPr lang="uk-UA" dirty="0"/>
+          </a:p>
+        </p:txBody>
+      </p:sp>
+      <p:sp>
+        <p:nvSpPr>
+          <p:cNvPr id="3" name="Содержимое 2"/>
+          <p:cNvSpPr>
+            <a:spLocks noGrp="1"/>
+          </p:cNvSpPr>
+          <p:nvPr>
+            <p:ph idx="1"/>
+          </p:nvPr>
+        </p:nvSpPr>
+        <p:spPr/>
+        <p:txBody>
+          <a:bodyPr>
+            <a:normAutofit fontScale="92500" lnSpcReduction="20000"/>
+          </a:bodyPr>
+          <a:lstStyle/>
+          <a:p>
+            <a:r>
+              <a:rPr lang="uk-UA" b="1" dirty="0" smtClean="0"/>
+              <a:t>Назва змінної  відображає її призначення.</a:t>
+            </a:r>
+          </a:p>
+          <a:p>
+            <a:r>
+              <a:rPr lang="uk-UA" dirty="0" smtClean="0"/>
+              <a:t>Назви сутностей</a:t>
+            </a:r>
+          </a:p>
+          <a:p>
+            <a:pPr lvl="1"/>
+            <a:r>
+              <a:rPr lang="en-US" sz="2600" dirty="0" smtClean="0"/>
+              <a:t>user, report, </a:t>
+            </a:r>
+            <a:r>
+              <a:rPr lang="en-US" sz="2600" dirty="0" err="1" smtClean="0"/>
+              <a:t>oldReport</a:t>
+            </a:r>
+            <a:r>
+              <a:rPr lang="en-US" sz="2600" dirty="0" smtClean="0"/>
+              <a:t>, </a:t>
+            </a:r>
+            <a:r>
+              <a:rPr lang="en-US" sz="2600" dirty="0" err="1" smtClean="0"/>
+              <a:t>newReport</a:t>
+            </a:r>
+            <a:r>
+              <a:rPr lang="en-US" sz="2600" dirty="0" smtClean="0"/>
+              <a:t>, </a:t>
+            </a:r>
+            <a:r>
+              <a:rPr lang="en-US" sz="2600" dirty="0" err="1" smtClean="0"/>
+              <a:t>editedProduct</a:t>
+            </a:r>
+            <a:endParaRPr lang="en-US" sz="2600" dirty="0" smtClean="0"/>
+          </a:p>
+          <a:p>
+            <a:pPr lvl="1"/>
+            <a:r>
+              <a:rPr lang="en-US" sz="2600" strike="sngStrike" dirty="0" smtClean="0"/>
+              <a:t>user3</a:t>
+            </a:r>
+            <a:r>
+              <a:rPr lang="en-US" sz="2600" dirty="0" smtClean="0"/>
+              <a:t>, </a:t>
+            </a:r>
+            <a:r>
+              <a:rPr lang="en-US" sz="2600" strike="sngStrike" dirty="0" err="1" smtClean="0"/>
+              <a:t>justCreatedProduct</a:t>
+            </a:r>
+            <a:endParaRPr lang="en-US" sz="2600" strike="sngStrike" dirty="0" smtClean="0"/>
+          </a:p>
+          <a:p>
+            <a:r>
+              <a:rPr lang="uk-UA" dirty="0" err="1" smtClean="0"/>
+              <a:t>Паттерн</a:t>
+            </a:r>
+            <a:r>
+              <a:rPr lang="uk-UA" dirty="0" smtClean="0"/>
+              <a:t> орієнтовані назви</a:t>
+            </a:r>
+          </a:p>
+          <a:p>
+            <a:pPr lvl="1"/>
+            <a:r>
+              <a:rPr lang="en-US" sz="2600" dirty="0" err="1" smtClean="0"/>
+              <a:t>SallaryCalculationStrategy</a:t>
+            </a:r>
+            <a:r>
+              <a:rPr lang="en-US" sz="2600" dirty="0" smtClean="0"/>
+              <a:t>, </a:t>
+            </a:r>
+            <a:r>
+              <a:rPr lang="en-US" sz="2600" dirty="0" err="1" smtClean="0"/>
+              <a:t>ReportBuilder</a:t>
+            </a:r>
+            <a:r>
+              <a:rPr lang="en-US" sz="2600" dirty="0" smtClean="0"/>
+              <a:t>, </a:t>
+            </a:r>
+            <a:r>
+              <a:rPr lang="en-US" sz="2600" dirty="0" err="1" smtClean="0"/>
+              <a:t>UserDao</a:t>
+            </a:r>
+            <a:endParaRPr lang="uk-UA" sz="2600" dirty="0" smtClean="0"/>
+          </a:p>
+          <a:p>
+            <a:r>
+              <a:rPr lang="uk-UA" dirty="0" smtClean="0"/>
+              <a:t>Назви специфічні для конкретного рішення</a:t>
+            </a:r>
+          </a:p>
+          <a:p>
+            <a:pPr lvl="1"/>
+            <a:r>
+              <a:rPr lang="en-US" sz="2600" dirty="0" err="1" smtClean="0"/>
+              <a:t>JobProcessor</a:t>
+            </a:r>
+            <a:endParaRPr lang="en-US" sz="2600" dirty="0" smtClean="0"/>
+          </a:p>
+          <a:p>
+            <a:r>
+              <a:rPr lang="uk-UA" dirty="0" smtClean="0"/>
+              <a:t>Допоміжні змінні в синтаксичних конструкціях</a:t>
+            </a:r>
+            <a:endParaRPr lang="en-US" dirty="0" smtClean="0"/>
+          </a:p>
+          <a:p>
+            <a:pPr lvl="1"/>
+            <a:r>
+              <a:rPr lang="en-US" sz="2600" dirty="0" smtClean="0"/>
+              <a:t>I, j </a:t>
+            </a:r>
+            <a:r>
+              <a:rPr lang="uk-UA" sz="2600" dirty="0" smtClean="0"/>
+              <a:t>в циклах</a:t>
+            </a:r>
+            <a:endParaRPr lang="uk-UA" sz="2600" dirty="0"/>
+          </a:p>
+        </p:txBody>
+      </p:sp>
+    </p:spTree>
+  </p:cSld>
+  <p:clrMapOvr>
+    <a:masterClrMapping/>
+  </p:clrMapOvr>
+</p:sld>
+</file>
+
+<file path=ppt/slides/slide19.xml><?xml version="1.0" encoding="utf-8"?>
+<p:sld xmlns:a="http://schemas.openxmlformats.org/drawingml/2006/main" xmlns:r="http://schemas.openxmlformats.org/officeDocument/2006/relationships" xmlns:p="http://schemas.openxmlformats.org/presentationml/2006/main">
+  <p:cSld>
+    <p:spTree>
+      <p:nvGrpSpPr>
+        <p:cNvPr id="1" name=""/>
+        <p:cNvGrpSpPr/>
+        <p:nvPr/>
+      </p:nvGrpSpPr>
+      <p:grpSpPr>
+        <a:xfrm>
+          <a:off x="0" y="0"/>
+          <a:ext cx="0" cy="0"/>
+          <a:chOff x="0" y="0"/>
+          <a:chExt cx="0" cy="0"/>
+        </a:xfrm>
+      </p:grpSpPr>
+      <p:sp>
+        <p:nvSpPr>
+          <p:cNvPr id="2" name="Заголовок 1"/>
+          <p:cNvSpPr>
+            <a:spLocks noGrp="1"/>
+          </p:cNvSpPr>
+          <p:nvPr>
+            <p:ph type="title"/>
+          </p:nvPr>
+        </p:nvSpPr>
+        <p:spPr/>
+        <p:txBody>
+          <a:bodyPr/>
+          <a:lstStyle/>
+          <a:p>
+            <a:r>
+              <a:rPr lang="uk-UA" dirty="0" smtClean="0"/>
+              <a:t>Невдалі назви</a:t>
+            </a:r>
+            <a:endParaRPr lang="uk-UA" dirty="0"/>
+          </a:p>
+        </p:txBody>
+      </p:sp>
+      <p:sp>
+        <p:nvSpPr>
+          <p:cNvPr id="3" name="Содержимое 2"/>
+          <p:cNvSpPr>
+            <a:spLocks noGrp="1"/>
+          </p:cNvSpPr>
+          <p:nvPr>
+            <p:ph idx="1"/>
+          </p:nvPr>
+        </p:nvSpPr>
+        <p:spPr/>
+        <p:txBody>
+          <a:bodyPr/>
+          <a:lstStyle/>
+          <a:p>
+            <a:r>
+              <a:rPr lang="uk-UA" dirty="0" smtClean="0"/>
+              <a:t>Схожі назви, які не передають різницю призначення (</a:t>
+            </a:r>
+            <a:r>
+              <a:rPr lang="uk-UA" strike="sngStrike" dirty="0" err="1" smtClean="0"/>
+              <a:t>user</a:t>
+            </a:r>
+            <a:r>
+              <a:rPr lang="uk-UA" strike="sngStrike" dirty="0" smtClean="0"/>
+              <a:t>, </a:t>
+            </a:r>
+            <a:r>
+              <a:rPr lang="uk-UA" strike="sngStrike" dirty="0" err="1" smtClean="0"/>
+              <a:t>userInfo</a:t>
+            </a:r>
+            <a:r>
+              <a:rPr lang="uk-UA" dirty="0" smtClean="0"/>
+              <a:t>,  </a:t>
+            </a:r>
+            <a:r>
+              <a:rPr lang="uk-UA" strike="sngStrike" dirty="0" err="1" smtClean="0"/>
+              <a:t>report</a:t>
+            </a:r>
+            <a:r>
+              <a:rPr lang="uk-UA" strike="sngStrike" dirty="0" smtClean="0"/>
+              <a:t>, </a:t>
+            </a:r>
+            <a:r>
+              <a:rPr lang="uk-UA" strike="sngStrike" dirty="0" err="1" smtClean="0"/>
+              <a:t>reportData</a:t>
+            </a:r>
+            <a:r>
+              <a:rPr lang="uk-UA" dirty="0" smtClean="0"/>
+              <a:t>)</a:t>
+            </a:r>
+          </a:p>
+          <a:p>
+            <a:r>
+              <a:rPr lang="uk-UA" dirty="0" smtClean="0"/>
+              <a:t>Назва типу у змінній коли це і так зрозуміло (</a:t>
+            </a:r>
+            <a:r>
+              <a:rPr lang="uk-UA" strike="sngStrike" dirty="0" err="1" smtClean="0"/>
+              <a:t>reportObject</a:t>
+            </a:r>
+            <a:r>
+              <a:rPr lang="uk-UA" strike="sngStrike" dirty="0" smtClean="0"/>
+              <a:t>, </a:t>
+            </a:r>
+            <a:r>
+              <a:rPr lang="uk-UA" strike="sngStrike" dirty="0" err="1" smtClean="0"/>
+              <a:t>descriptionText</a:t>
+            </a:r>
+            <a:r>
+              <a:rPr lang="uk-UA" dirty="0" smtClean="0"/>
+              <a:t>)</a:t>
+            </a:r>
+          </a:p>
+          <a:p>
+            <a:r>
+              <a:rPr lang="uk-UA" dirty="0" smtClean="0"/>
+              <a:t>Лишні префікси контексту</a:t>
+            </a:r>
+            <a:r>
+              <a:rPr lang="en-US" dirty="0" smtClean="0"/>
+              <a:t>. </a:t>
+            </a:r>
+            <a:r>
+              <a:rPr lang="ru-RU" dirty="0" err="1" smtClean="0"/>
+              <a:t>Наприклад</a:t>
+            </a:r>
+            <a:r>
+              <a:rPr lang="ru-RU" dirty="0" smtClean="0"/>
+              <a:t> </a:t>
+            </a:r>
+            <a:r>
+              <a:rPr lang="ru-RU" dirty="0" err="1" smtClean="0"/>
+              <a:t>назва</a:t>
+            </a:r>
+            <a:r>
+              <a:rPr lang="ru-RU" dirty="0" smtClean="0"/>
+              <a:t> </a:t>
+            </a:r>
+            <a:r>
+              <a:rPr lang="ru-RU" dirty="0" err="1" smtClean="0"/>
+              <a:t>аплікації</a:t>
+            </a:r>
+            <a:r>
+              <a:rPr lang="ru-RU" dirty="0" smtClean="0"/>
+              <a:t> перед </a:t>
+            </a:r>
+            <a:r>
+              <a:rPr lang="ru-RU" dirty="0" err="1" smtClean="0"/>
+              <a:t>назвою</a:t>
+            </a:r>
+            <a:r>
+              <a:rPr lang="ru-RU" dirty="0" smtClean="0"/>
+              <a:t> </a:t>
+            </a:r>
+            <a:r>
+              <a:rPr lang="ru-RU" dirty="0" err="1" smtClean="0"/>
+              <a:t>класів</a:t>
+            </a:r>
+            <a:r>
+              <a:rPr lang="ru-RU" dirty="0" smtClean="0"/>
+              <a:t>.</a:t>
+            </a:r>
+            <a:endParaRPr lang="uk-UA" dirty="0" smtClean="0"/>
           </a:p>
         </p:txBody>
       </p:sp>
@@ -4977,14 +5465,12 @@
         </p:nvSpPr>
         <p:spPr/>
         <p:txBody>
-          <a:bodyPr>
-            <a:normAutofit/>
-          </a:bodyPr>
+          <a:bodyPr/>
           <a:lstStyle/>
           <a:p>
             <a:r>
               <a:rPr lang="uk-UA" dirty="0" smtClean="0"/>
-              <a:t>Характеристики хорошого коду</a:t>
+              <a:t>Що потрібно хорошому коду ?</a:t>
             </a:r>
             <a:endParaRPr lang="uk-UA" dirty="0"/>
           </a:p>
@@ -5000,73 +5486,29 @@
             <p:ph idx="1"/>
           </p:nvPr>
         </p:nvSpPr>
-        <p:spPr>
-          <a:xfrm>
-            <a:off x="457200" y="1600200"/>
-            <a:ext cx="8229600" cy="4493096"/>
-          </a:xfrm>
-        </p:spPr>
-        <p:txBody>
-          <a:bodyPr>
-            <a:normAutofit/>
-          </a:bodyPr>
-          <a:lstStyle/>
-          <a:p>
-            <a:pPr marL="914400" lvl="1" indent="-514350"/>
-            <a:r>
-              <a:rPr lang="uk-UA" b="1" dirty="0" smtClean="0"/>
-              <a:t>Зрозумілість</a:t>
-            </a:r>
-          </a:p>
-          <a:p>
-            <a:pPr marL="914400" lvl="1" indent="-514350"/>
-            <a:r>
-              <a:rPr lang="uk-UA" dirty="0" smtClean="0"/>
-              <a:t>Зібраність</a:t>
-            </a:r>
-          </a:p>
-          <a:p>
-            <a:pPr marL="914400" lvl="1" indent="-514350"/>
-            <a:r>
-              <a:rPr lang="uk-UA" dirty="0" smtClean="0"/>
-              <a:t>Чіткі абстракції</a:t>
-            </a:r>
-          </a:p>
-          <a:p>
-            <a:pPr marL="914400" lvl="1" indent="-514350"/>
-            <a:r>
-              <a:rPr lang="uk-UA" dirty="0" smtClean="0"/>
-              <a:t>Прямолінійність</a:t>
-            </a:r>
-          </a:p>
-          <a:p>
-            <a:pPr marL="914400" lvl="1" indent="-514350"/>
-            <a:r>
-              <a:rPr lang="uk-UA" dirty="0" smtClean="0"/>
-              <a:t>Мінімалістичність</a:t>
-            </a:r>
-          </a:p>
-          <a:p>
-            <a:pPr marL="914400" lvl="1" indent="-514350"/>
-            <a:r>
-              <a:rPr lang="uk-UA" dirty="0"/>
-              <a:t>Повнота</a:t>
-            </a:r>
-            <a:endParaRPr lang="uk-UA" dirty="0" smtClean="0"/>
-          </a:p>
-          <a:p>
-            <a:pPr marL="914400" lvl="1" indent="-514350"/>
-            <a:r>
-              <a:rPr lang="uk-UA" dirty="0" smtClean="0"/>
-              <a:t>…</a:t>
-            </a:r>
-          </a:p>
+        <p:spPr/>
+        <p:txBody>
+          <a:bodyPr/>
+          <a:lstStyle/>
           <a:p>
             <a:pPr marL="514350" indent="-514350">
               <a:buFont typeface="+mj-lt"/>
               <a:buAutoNum type="arabicPeriod"/>
             </a:pPr>
-            <a:endParaRPr lang="uk-UA" dirty="0" smtClean="0"/>
+            <a:r>
+              <a:rPr lang="uk-UA" sz="3600" b="1" dirty="0" smtClean="0"/>
+              <a:t>Чітко визначена мета (призначення). </a:t>
+            </a:r>
+          </a:p>
+          <a:p>
+            <a:pPr marL="514350" indent="-514350">
+              <a:buFont typeface="+mj-lt"/>
+              <a:buAutoNum type="arabicPeriod"/>
+            </a:pPr>
+            <a:r>
+              <a:rPr lang="uk-UA" dirty="0" smtClean="0"/>
+              <a:t>Правильне технічне вираження (реалізація)</a:t>
+            </a:r>
           </a:p>
         </p:txBody>
       </p:sp>
@@ -5082,6 +5524,366 @@
       </p:par>
     </p:tnLst>
   </p:timing>
+</p:sld>
+</file>
+
+<file path=ppt/slides/slide20.xml><?xml version="1.0" encoding="utf-8"?>
+<p:sld xmlns:a="http://schemas.openxmlformats.org/drawingml/2006/main" xmlns:r="http://schemas.openxmlformats.org/officeDocument/2006/relationships" xmlns:p="http://schemas.openxmlformats.org/presentationml/2006/main">
+  <p:cSld>
+    <p:spTree>
+      <p:nvGrpSpPr>
+        <p:cNvPr id="1" name=""/>
+        <p:cNvGrpSpPr/>
+        <p:nvPr/>
+      </p:nvGrpSpPr>
+      <p:grpSpPr>
+        <a:xfrm>
+          <a:off x="0" y="0"/>
+          <a:ext cx="0" cy="0"/>
+          <a:chOff x="0" y="0"/>
+          <a:chExt cx="0" cy="0"/>
+        </a:xfrm>
+      </p:grpSpPr>
+      <p:sp>
+        <p:nvSpPr>
+          <p:cNvPr id="2" name="Заголовок 1"/>
+          <p:cNvSpPr>
+            <a:spLocks noGrp="1"/>
+          </p:cNvSpPr>
+          <p:nvPr>
+            <p:ph type="title"/>
+          </p:nvPr>
+        </p:nvSpPr>
+        <p:spPr/>
+        <p:txBody>
+          <a:bodyPr/>
+          <a:lstStyle/>
+          <a:p>
+            <a:r>
+              <a:rPr lang="uk-UA" dirty="0" smtClean="0"/>
+              <a:t>Дерево проекту</a:t>
+            </a:r>
+            <a:endParaRPr lang="uk-UA" dirty="0"/>
+          </a:p>
+        </p:txBody>
+      </p:sp>
+      <p:sp>
+        <p:nvSpPr>
+          <p:cNvPr id="3" name="Содержимое 2"/>
+          <p:cNvSpPr>
+            <a:spLocks noGrp="1"/>
+          </p:cNvSpPr>
+          <p:nvPr>
+            <p:ph idx="1"/>
+          </p:nvPr>
+        </p:nvSpPr>
+        <p:spPr>
+          <a:xfrm>
+            <a:off x="467544" y="2636912"/>
+            <a:ext cx="8229600" cy="4032448"/>
+          </a:xfrm>
+        </p:spPr>
+        <p:style>
+          <a:lnRef idx="0">
+            <a:scrgbClr r="0" g="0" b="0"/>
+          </a:lnRef>
+          <a:fillRef idx="1001">
+            <a:schemeClr val="lt2"/>
+          </a:fillRef>
+          <a:effectRef idx="0">
+            <a:scrgbClr r="0" g="0" b="0"/>
+          </a:effectRef>
+          <a:fontRef idx="major"/>
+        </p:style>
+        <p:txBody>
+          <a:bodyPr>
+            <a:normAutofit fontScale="92500" lnSpcReduction="10000"/>
+          </a:bodyPr>
+          <a:lstStyle/>
+          <a:p>
+            <a:r>
+              <a:rPr lang="en-US" sz="2400" dirty="0" smtClean="0"/>
+              <a:t>Services</a:t>
+            </a:r>
+          </a:p>
+          <a:p>
+            <a:pPr lvl="1">
+              <a:buFont typeface="Arial" pitchFamily="34" charset="0"/>
+              <a:buChar char="•"/>
+            </a:pPr>
+            <a:r>
+              <a:rPr lang="en-US" sz="2000" dirty="0" smtClean="0"/>
+              <a:t>Implementation</a:t>
+            </a:r>
+          </a:p>
+          <a:p>
+            <a:pPr lvl="2"/>
+            <a:r>
+              <a:rPr lang="en-US" sz="1600" dirty="0" err="1" smtClean="0"/>
+              <a:t>LogerService.cs</a:t>
+            </a:r>
+            <a:endParaRPr lang="en-US" sz="1600" dirty="0" smtClean="0"/>
+          </a:p>
+          <a:p>
+            <a:pPr lvl="2"/>
+            <a:r>
+              <a:rPr lang="en-US" sz="1600" dirty="0" err="1" smtClean="0"/>
+              <a:t>SecurityService.cs</a:t>
+            </a:r>
+            <a:endParaRPr lang="en-US" sz="1200" dirty="0" smtClean="0"/>
+          </a:p>
+          <a:p>
+            <a:pPr lvl="1">
+              <a:buFont typeface="Arial" pitchFamily="34" charset="0"/>
+              <a:buChar char="•"/>
+            </a:pPr>
+            <a:r>
+              <a:rPr lang="en-US" sz="2000" dirty="0" err="1" smtClean="0"/>
+              <a:t>ILoggerService.cs</a:t>
+            </a:r>
+            <a:endParaRPr lang="en-US" sz="2000" dirty="0" smtClean="0"/>
+          </a:p>
+          <a:p>
+            <a:pPr lvl="1">
+              <a:buFont typeface="Arial" pitchFamily="34" charset="0"/>
+              <a:buChar char="•"/>
+            </a:pPr>
+            <a:r>
+              <a:rPr lang="en-US" sz="2000" dirty="0" err="1" smtClean="0"/>
+              <a:t>ISecurityService.cs</a:t>
+            </a:r>
+            <a:endParaRPr lang="uk-UA" sz="2000" dirty="0" smtClean="0"/>
+          </a:p>
+          <a:p>
+            <a:r>
+              <a:rPr lang="en-US" sz="2400" dirty="0" smtClean="0"/>
+              <a:t>Views</a:t>
+            </a:r>
+          </a:p>
+          <a:p>
+            <a:pPr lvl="1">
+              <a:buFont typeface="Arial" pitchFamily="34" charset="0"/>
+              <a:buChar char="•"/>
+            </a:pPr>
+            <a:r>
+              <a:rPr lang="en-US" sz="2000" dirty="0" smtClean="0"/>
+              <a:t>CreateUser.html</a:t>
+            </a:r>
+          </a:p>
+          <a:p>
+            <a:pPr lvl="1">
+              <a:buFont typeface="Arial" pitchFamily="34" charset="0"/>
+              <a:buChar char="•"/>
+            </a:pPr>
+            <a:r>
+              <a:rPr lang="en-US" sz="2000" dirty="0" smtClean="0"/>
+              <a:t>EditUser.html</a:t>
+            </a:r>
+          </a:p>
+          <a:p>
+            <a:r>
+              <a:rPr lang="en-US" sz="2400" dirty="0" smtClean="0"/>
+              <a:t>Controllers</a:t>
+            </a:r>
+          </a:p>
+          <a:p>
+            <a:r>
+              <a:rPr lang="en-US" sz="2400" dirty="0" smtClean="0"/>
+              <a:t>Models</a:t>
+            </a:r>
+          </a:p>
+          <a:p>
+            <a:r>
+              <a:rPr lang="en-US" sz="2400" dirty="0" err="1" smtClean="0"/>
+              <a:t>Utils</a:t>
+            </a:r>
+            <a:endParaRPr lang="ru-RU" sz="2400" dirty="0" smtClean="0"/>
+          </a:p>
+        </p:txBody>
+      </p:sp>
+      <p:sp>
+        <p:nvSpPr>
+          <p:cNvPr id="4" name="Содержимое 2"/>
+          <p:cNvSpPr txBox="1">
+            <a:spLocks/>
+          </p:cNvSpPr>
+          <p:nvPr/>
+        </p:nvSpPr>
+        <p:spPr>
+          <a:xfrm>
+            <a:off x="611560" y="1412776"/>
+            <a:ext cx="8229600" cy="1180727"/>
+          </a:xfrm>
+          <a:prstGeom prst="rect">
+            <a:avLst/>
+          </a:prstGeom>
+        </p:spPr>
+        <p:txBody>
+          <a:bodyPr vert="horz" lIns="91440" tIns="45720" rIns="91440" bIns="45720" rtlCol="0">
+            <a:normAutofit/>
+          </a:bodyPr>
+          <a:lstStyle/>
+          <a:p>
+            <a:pPr marL="342900" marR="0" lvl="0" indent="-342900" algn="l" defTabSz="914400" rtl="0" eaLnBrk="1" fontAlgn="auto" latinLnBrk="0" hangingPunct="1">
+              <a:lnSpc>
+                <a:spcPct val="100000"/>
+              </a:lnSpc>
+              <a:spcBef>
+                <a:spcPct val="20000"/>
+              </a:spcBef>
+              <a:spcAft>
+                <a:spcPts val="0"/>
+              </a:spcAft>
+              <a:buClrTx/>
+              <a:buSzTx/>
+              <a:buFont typeface="Arial" pitchFamily="34" charset="0"/>
+              <a:buChar char="•"/>
+              <a:tabLst/>
+              <a:defRPr/>
+            </a:pPr>
+            <a:r>
+              <a:rPr kumimoji="0" lang="uk-UA" sz="2800" b="0" i="0" u="none" strike="noStrike" kern="1200" cap="none" spc="0" normalizeH="0" baseline="0" noProof="0" dirty="0" smtClean="0">
+                <a:ln>
+                  <a:noFill/>
+                </a:ln>
+                <a:solidFill>
+                  <a:schemeClr val="tx1"/>
+                </a:solidFill>
+                <a:effectLst/>
+                <a:uLnTx/>
+                <a:uFillTx/>
+                <a:latin typeface="+mn-lt"/>
+                <a:ea typeface="+mn-ea"/>
+                <a:cs typeface="+mn-cs"/>
+              </a:rPr>
+              <a:t>По осі </a:t>
+            </a:r>
+            <a:r>
+              <a:rPr kumimoji="0" lang="en-US" sz="2800" b="0" i="0" u="none" strike="noStrike" kern="1200" cap="none" spc="0" normalizeH="0" baseline="0" noProof="0" dirty="0" smtClean="0">
+                <a:ln>
+                  <a:noFill/>
+                </a:ln>
+                <a:solidFill>
+                  <a:schemeClr val="tx1"/>
+                </a:solidFill>
+                <a:effectLst/>
+                <a:uLnTx/>
+                <a:uFillTx/>
+                <a:latin typeface="+mn-lt"/>
+                <a:ea typeface="+mn-ea"/>
+                <a:cs typeface="+mn-cs"/>
+              </a:rPr>
+              <a:t>Y – </a:t>
+            </a:r>
+            <a:r>
+              <a:rPr kumimoji="0" lang="uk-UA" sz="2800" b="0" i="0" u="none" strike="noStrike" kern="1200" cap="none" spc="0" normalizeH="0" baseline="0" noProof="0" dirty="0" smtClean="0">
+                <a:ln>
+                  <a:noFill/>
+                </a:ln>
+                <a:solidFill>
+                  <a:schemeClr val="tx1"/>
+                </a:solidFill>
+                <a:effectLst/>
+                <a:uLnTx/>
+                <a:uFillTx/>
+                <a:latin typeface="+mn-lt"/>
+                <a:ea typeface="+mn-ea"/>
+                <a:cs typeface="+mn-cs"/>
+              </a:rPr>
+              <a:t>призначення</a:t>
+            </a:r>
+          </a:p>
+          <a:p>
+            <a:pPr marL="342900" marR="0" lvl="0" indent="-342900" algn="l" defTabSz="914400" rtl="0" eaLnBrk="1" fontAlgn="auto" latinLnBrk="0" hangingPunct="1">
+              <a:lnSpc>
+                <a:spcPct val="100000"/>
+              </a:lnSpc>
+              <a:spcBef>
+                <a:spcPct val="20000"/>
+              </a:spcBef>
+              <a:spcAft>
+                <a:spcPts val="0"/>
+              </a:spcAft>
+              <a:buClrTx/>
+              <a:buSzTx/>
+              <a:buFont typeface="Arial" pitchFamily="34" charset="0"/>
+              <a:buChar char="•"/>
+              <a:tabLst/>
+              <a:defRPr/>
+            </a:pPr>
+            <a:r>
+              <a:rPr kumimoji="0" lang="uk-UA" sz="2800" b="0" i="0" u="none" strike="noStrike" kern="1200" cap="none" spc="0" normalizeH="0" baseline="0" noProof="0" dirty="0" smtClean="0">
+                <a:ln>
+                  <a:noFill/>
+                </a:ln>
+                <a:solidFill>
+                  <a:schemeClr val="tx1"/>
+                </a:solidFill>
+                <a:effectLst/>
+                <a:uLnTx/>
+                <a:uFillTx/>
+                <a:latin typeface="+mn-lt"/>
+                <a:ea typeface="+mn-ea"/>
+                <a:cs typeface="+mn-cs"/>
+              </a:rPr>
+              <a:t>По осі </a:t>
+            </a:r>
+            <a:r>
+              <a:rPr kumimoji="0" lang="en-US" sz="2800" b="0" i="0" u="none" strike="noStrike" kern="1200" cap="none" spc="0" normalizeH="0" baseline="0" noProof="0" dirty="0" smtClean="0">
+                <a:ln>
+                  <a:noFill/>
+                </a:ln>
+                <a:solidFill>
+                  <a:schemeClr val="tx1"/>
+                </a:solidFill>
+                <a:effectLst/>
+                <a:uLnTx/>
+                <a:uFillTx/>
+                <a:latin typeface="+mn-lt"/>
+                <a:ea typeface="+mn-ea"/>
+                <a:cs typeface="+mn-cs"/>
+              </a:rPr>
+              <a:t>X – </a:t>
+            </a:r>
+            <a:r>
+              <a:rPr kumimoji="0" lang="uk-UA" sz="2800" b="0" i="0" u="none" strike="noStrike" kern="1200" cap="none" spc="0" normalizeH="0" baseline="0" noProof="0" dirty="0" smtClean="0">
+                <a:ln>
+                  <a:noFill/>
+                </a:ln>
+                <a:solidFill>
+                  <a:schemeClr val="tx1"/>
+                </a:solidFill>
+                <a:effectLst/>
+                <a:uLnTx/>
+                <a:uFillTx/>
+                <a:latin typeface="+mn-lt"/>
+                <a:ea typeface="+mn-ea"/>
+                <a:cs typeface="+mn-cs"/>
+              </a:rPr>
+              <a:t>рівень абстракції</a:t>
+            </a:r>
+            <a:endParaRPr kumimoji="0" lang="ru-RU" sz="2800" b="0" i="0" u="none" strike="noStrike" kern="1200" cap="none" spc="0" normalizeH="0" baseline="0" noProof="0" dirty="0" smtClean="0">
+              <a:ln>
+                <a:noFill/>
+              </a:ln>
+              <a:solidFill>
+                <a:schemeClr val="tx1"/>
+              </a:solidFill>
+              <a:effectLst/>
+              <a:uLnTx/>
+              <a:uFillTx/>
+              <a:latin typeface="+mn-lt"/>
+              <a:ea typeface="+mn-ea"/>
+              <a:cs typeface="+mn-cs"/>
+            </a:endParaRPr>
+          </a:p>
+        </p:txBody>
+      </p:sp>
+    </p:spTree>
+  </p:cSld>
+  <p:clrMapOvr>
+    <a:masterClrMapping/>
+  </p:clrMapOvr>
 </p:sld>
 </file>
 
@@ -5112,42 +5914,23 @@
             <p:ph type="title"/>
           </p:nvPr>
         </p:nvSpPr>
-        <p:spPr/>
-        <p:txBody>
-          <a:bodyPr/>
-          <a:lstStyle/>
-          <a:p>
-            <a:r>
-              <a:rPr lang="uk-UA" dirty="0" smtClean="0"/>
-              <a:t>Звідки</a:t>
-            </a:r>
-            <a:r>
-              <a:rPr lang="uk-UA" baseline="0" dirty="0" smtClean="0"/>
-              <a:t> береться поганий код?</a:t>
-            </a:r>
-            <a:endParaRPr lang="uk-UA" dirty="0"/>
-          </a:p>
-        </p:txBody>
-      </p:sp>
-      <p:sp>
-        <p:nvSpPr>
-          <p:cNvPr id="3" name="Содержимое 2"/>
-          <p:cNvSpPr>
-            <a:spLocks noGrp="1"/>
-          </p:cNvSpPr>
-          <p:nvPr>
-            <p:ph idx="1"/>
-          </p:nvPr>
-        </p:nvSpPr>
-        <p:spPr/>
-        <p:txBody>
-          <a:bodyPr/>
-          <a:lstStyle/>
-          <a:p>
-            <a:r>
-              <a:rPr lang="uk-UA" dirty="0" smtClean="0"/>
-              <a:t>Поганий код з'являється тоді коли в ньому відсутні характеристики хорошого коду  </a:t>
-            </a:r>
+        <p:spPr>
+          <a:xfrm>
+            <a:off x="467544" y="2636912"/>
+            <a:ext cx="8229600" cy="1143000"/>
+          </a:xfrm>
+        </p:spPr>
+        <p:txBody>
+          <a:bodyPr>
+            <a:normAutofit/>
+          </a:bodyPr>
+          <a:lstStyle/>
+          <a:p>
+            <a:r>
+              <a:rPr lang="uk-UA" b="1" dirty="0" smtClean="0"/>
+              <a:t>Призначення диктує форму</a:t>
+            </a:r>
+            <a:endParaRPr lang="uk-UA" b="1" dirty="0"/>
           </a:p>
         </p:txBody>
       </p:sp>
@@ -5156,13 +5939,6 @@
   <p:clrMapOvr>
     <a:masterClrMapping/>
   </p:clrMapOvr>
-  <p:timing>
-    <p:tnLst>
-      <p:par>
-        <p:cTn id="1" dur="indefinite" restart="never" nodeType="tmRoot"/>
-      </p:par>
-    </p:tnLst>
-  </p:timing>
 </p:sld>
 </file>
 
@@ -5185,52 +5961,6 @@
       </p:grpSpPr>
       <p:sp>
         <p:nvSpPr>
-          <p:cNvPr id="3" name="Содержимое 2"/>
-          <p:cNvSpPr>
-            <a:spLocks noGrp="1"/>
-          </p:cNvSpPr>
-          <p:nvPr>
-            <p:ph idx="1"/>
-          </p:nvPr>
-        </p:nvSpPr>
-        <p:spPr/>
-        <p:txBody>
-          <a:bodyPr/>
-          <a:lstStyle/>
-          <a:p>
-            <a:r>
-              <a:rPr lang="uk-UA" b="1" dirty="0" smtClean="0"/>
-              <a:t>Від вищого рівня абстракції до нижчого</a:t>
-            </a:r>
-          </a:p>
-          <a:p>
-            <a:r>
-              <a:rPr lang="uk-UA" b="1" dirty="0" smtClean="0"/>
-              <a:t>Одна мета (призначення) – один рівень абстракції – один </a:t>
-            </a:r>
-            <a:r>
-              <a:rPr lang="ru-RU" b="1" dirty="0" smtClean="0"/>
-              <a:t>контекст</a:t>
-            </a:r>
-            <a:r>
-              <a:rPr lang="uk-UA" sz="2800" dirty="0" smtClean="0"/>
-              <a:t>(за винятком допоміжних конструкцій з тимчасовими змінними)</a:t>
-            </a:r>
-          </a:p>
-          <a:p>
-            <a:r>
-              <a:rPr lang="uk-UA" b="1" dirty="0"/>
-              <a:t>П</a:t>
-            </a:r>
-            <a:r>
-              <a:rPr lang="uk-UA" b="1" dirty="0" smtClean="0"/>
-              <a:t>росто і очевидно</a:t>
-            </a:r>
-          </a:p>
-        </p:txBody>
-      </p:sp>
-      <p:sp>
-        <p:nvSpPr>
           <p:cNvPr id="2" name="Заголовок 1"/>
           <p:cNvSpPr>
             <a:spLocks noGrp="1"/>
@@ -5239,16 +5969,21 @@
             <p:ph type="title"/>
           </p:nvPr>
         </p:nvSpPr>
-        <p:spPr/>
+        <p:spPr>
+          <a:xfrm>
+            <a:off x="395536" y="2780928"/>
+            <a:ext cx="8229600" cy="1143000"/>
+          </a:xfrm>
+        </p:spPr>
         <p:txBody>
           <a:bodyPr>
-            <a:normAutofit/>
+            <a:normAutofit fontScale="90000"/>
           </a:bodyPr>
           <a:lstStyle/>
           <a:p>
             <a:r>
               <a:rPr lang="uk-UA" dirty="0" smtClean="0"/>
-              <a:t>Кодування має бути природнім</a:t>
+              <a:t>Що важливо під час написання коду?</a:t>
             </a:r>
             <a:endParaRPr lang="uk-UA" dirty="0"/>
           </a:p>
@@ -5259,13 +5994,6 @@
   <p:clrMapOvr>
     <a:masterClrMapping/>
   </p:clrMapOvr>
-  <p:timing>
-    <p:tnLst>
-      <p:par>
-        <p:cTn id="1" dur="indefinite" restart="never" nodeType="tmRoot"/>
-      </p:par>
-    </p:tnLst>
-  </p:timing>
 </p:sld>
 </file>
 
@@ -5296,54 +6024,21 @@
             <p:ph type="title"/>
           </p:nvPr>
         </p:nvSpPr>
-        <p:spPr/>
-        <p:txBody>
-          <a:bodyPr/>
-          <a:lstStyle/>
-          <a:p>
-            <a:r>
-              <a:rPr lang="uk-UA" dirty="0" smtClean="0"/>
-              <a:t>Виробництво (створення) коду</a:t>
-            </a:r>
-            <a:endParaRPr lang="uk-UA" dirty="0"/>
-          </a:p>
-        </p:txBody>
-      </p:sp>
-      <p:sp>
-        <p:nvSpPr>
-          <p:cNvPr id="3" name="Содержимое 2"/>
-          <p:cNvSpPr>
-            <a:spLocks noGrp="1"/>
-          </p:cNvSpPr>
-          <p:nvPr>
-            <p:ph idx="1"/>
-          </p:nvPr>
-        </p:nvSpPr>
-        <p:spPr/>
-        <p:txBody>
-          <a:bodyPr>
-            <a:normAutofit/>
-          </a:bodyPr>
-          <a:lstStyle/>
-          <a:p>
-            <a:pPr marL="514350" indent="-514350">
-              <a:buFont typeface="+mj-lt"/>
-              <a:buAutoNum type="arabicPeriod"/>
-            </a:pPr>
-            <a:r>
-              <a:rPr lang="uk-UA" dirty="0" smtClean="0"/>
-              <a:t>Визначення мети. </a:t>
-            </a:r>
-          </a:p>
-          <a:p>
-            <a:pPr marL="514350" indent="-514350">
-              <a:buFont typeface="+mj-lt"/>
-              <a:buAutoNum type="arabicPeriod"/>
-            </a:pPr>
-            <a:r>
-              <a:rPr lang="uk-UA" dirty="0" smtClean="0"/>
-              <a:t>Визначення кроків досягнення мети з найменшим рівнем деталізації. Якщо немає меншого рівня деталізації то написати відповідний код, інакше почати з пункту 1.</a:t>
-            </a:r>
+        <p:spPr>
+          <a:xfrm>
+            <a:off x="467544" y="2636912"/>
+            <a:ext cx="8229600" cy="1143000"/>
+          </a:xfrm>
+        </p:spPr>
+        <p:txBody>
+          <a:bodyPr/>
+          <a:lstStyle/>
+          <a:p>
+            <a:r>
+              <a:rPr lang="uk-UA" b="1" dirty="0" smtClean="0"/>
+              <a:t>Контекст</a:t>
+            </a:r>
+            <a:endParaRPr lang="uk-UA" b="1" dirty="0"/>
           </a:p>
         </p:txBody>
       </p:sp>
@@ -5352,13 +6047,6 @@
   <p:clrMapOvr>
     <a:masterClrMapping/>
   </p:clrMapOvr>
-  <p:timing>
-    <p:tnLst>
-      <p:par>
-        <p:cTn id="1" dur="indefinite" restart="never" nodeType="tmRoot"/>
-      </p:par>
-    </p:tnLst>
-  </p:timing>
 </p:sld>
 </file>
 
@@ -5391,7 +6079,7 @@
         </p:nvSpPr>
         <p:spPr>
           <a:xfrm>
-            <a:off x="395536" y="2060848"/>
+            <a:off x="539552" y="2708920"/>
             <a:ext cx="8229600" cy="1143000"/>
           </a:xfrm>
         </p:spPr>
@@ -5403,9 +6091,13 @@
           <a:p>
             <a:r>
               <a:rPr lang="uk-UA" b="1" dirty="0" smtClean="0"/>
-              <a:t>Поганий і НЕ поганий код</a:t>
-            </a:r>
-            <a:endParaRPr lang="uk-UA" b="1" dirty="0"/>
+              <a:t>Логічна послідовність</a:t>
+            </a:r>
+            <a:r>
+              <a:rPr lang="uk-UA" dirty="0" smtClean="0"/>
+              <a:t> інструкцій</a:t>
+            </a:r>
+            <a:endParaRPr lang="uk-UA" dirty="0"/>
           </a:p>
         </p:txBody>
       </p:sp>
@@ -5443,7 +6135,7 @@
       </p:grpSpPr>
       <p:sp>
         <p:nvSpPr>
-          <p:cNvPr id="2" name="Title 1"/>
+          <p:cNvPr id="2" name="Заголовок 1"/>
           <p:cNvSpPr>
             <a:spLocks noGrp="1"/>
           </p:cNvSpPr>
@@ -5451,60 +6143,36 @@
             <p:ph type="title"/>
           </p:nvPr>
         </p:nvSpPr>
-        <p:spPr/>
-        <p:txBody>
-          <a:bodyPr/>
-          <a:lstStyle/>
-          <a:p>
-            <a:r>
-              <a:rPr lang="uk-UA" dirty="0" smtClean="0"/>
-              <a:t>Функція</a:t>
-            </a:r>
-            <a:endParaRPr lang="uk-UA" dirty="0"/>
-          </a:p>
-        </p:txBody>
-      </p:sp>
-      <p:sp>
-        <p:nvSpPr>
-          <p:cNvPr id="3" name="Content Placeholder 2"/>
-          <p:cNvSpPr>
-            <a:spLocks noGrp="1"/>
-          </p:cNvSpPr>
-          <p:nvPr>
-            <p:ph idx="1"/>
-          </p:nvPr>
-        </p:nvSpPr>
-        <p:spPr/>
-        <p:txBody>
-          <a:bodyPr/>
-          <a:lstStyle/>
-          <a:p>
-            <a:pPr marL="742950" indent="-742950">
-              <a:buFont typeface="+mj-lt"/>
-              <a:buAutoNum type="arabicPeriod"/>
-            </a:pPr>
-            <a:r>
-              <a:rPr lang="uk-UA" sz="3600" b="1" dirty="0"/>
-              <a:t>Функція створюється для виконання однієї задачі в якомусь </a:t>
-            </a:r>
-            <a:r>
-              <a:rPr lang="uk-UA" sz="3600" b="1" dirty="0" smtClean="0"/>
-              <a:t>контексті</a:t>
-            </a:r>
-            <a:endParaRPr lang="uk-UA" sz="3600" b="1" dirty="0"/>
+        <p:spPr>
+          <a:xfrm>
+            <a:off x="467544" y="2708920"/>
+            <a:ext cx="8229600" cy="1143000"/>
+          </a:xfrm>
+        </p:spPr>
+        <p:txBody>
+          <a:bodyPr/>
+          <a:lstStyle/>
+          <a:p>
+            <a:r>
+              <a:rPr lang="uk-UA" b="1" dirty="0" smtClean="0"/>
+              <a:t>Чіткі абстракції</a:t>
+            </a:r>
+            <a:endParaRPr lang="uk-UA" b="1" dirty="0"/>
           </a:p>
         </p:txBody>
       </p:sp>
     </p:spTree>
-    <p:extLst>
-      <p:ext uri="{BB962C8B-B14F-4D97-AF65-F5344CB8AC3E}">
-        <p14:creationId xmlns:p14="http://schemas.microsoft.com/office/powerpoint/2010/main" xmlns="" val="4004276355"/>
-      </p:ext>
-    </p:extLst>
   </p:cSld>
   <p:clrMapOvr>
     <a:masterClrMapping/>
   </p:clrMapOvr>
+  <p:timing>
+    <p:tnLst>
+      <p:par>
+        <p:cTn id="1" dur="indefinite" restart="never" nodeType="tmRoot"/>
+      </p:par>
+    </p:tnLst>
+  </p:timing>
 </p:sld>
 </file>
 
@@ -5527,7 +6195,7 @@
       </p:grpSpPr>
       <p:sp>
         <p:nvSpPr>
-          <p:cNvPr id="2" name="Title 1"/>
+          <p:cNvPr id="2" name="Заголовок 1"/>
           <p:cNvSpPr>
             <a:spLocks noGrp="1"/>
           </p:cNvSpPr>
@@ -5535,148 +6203,29 @@
             <p:ph type="title"/>
           </p:nvPr>
         </p:nvSpPr>
-        <p:spPr/>
-        <p:txBody>
-          <a:bodyPr>
-            <a:normAutofit/>
-          </a:bodyPr>
-          <a:lstStyle/>
-          <a:p>
-            <a:r>
-              <a:rPr lang="uk-UA" dirty="0" smtClean="0"/>
-              <a:t>Інтерфейс функції</a:t>
-            </a:r>
-            <a:endParaRPr lang="uk-UA" dirty="0"/>
-          </a:p>
-        </p:txBody>
-      </p:sp>
-      <p:sp>
-        <p:nvSpPr>
-          <p:cNvPr id="3" name="Content Placeholder 2"/>
-          <p:cNvSpPr>
-            <a:spLocks noGrp="1"/>
-          </p:cNvSpPr>
-          <p:nvPr>
-            <p:ph idx="1"/>
-          </p:nvPr>
-        </p:nvSpPr>
-        <p:spPr/>
-        <p:txBody>
-          <a:bodyPr>
-            <a:normAutofit fontScale="92500" lnSpcReduction="10000"/>
-          </a:bodyPr>
-          <a:lstStyle/>
-          <a:p>
-            <a:r>
-              <a:rPr lang="uk-UA" dirty="0" smtClean="0"/>
-              <a:t>Дієслово (</a:t>
-            </a:r>
-            <a:r>
-              <a:rPr lang="en-US" dirty="0" smtClean="0"/>
-              <a:t>Run, Start, Connect</a:t>
-            </a:r>
-            <a:r>
-              <a:rPr lang="uk-UA" dirty="0" smtClean="0"/>
-              <a:t>)</a:t>
-            </a:r>
-          </a:p>
-          <a:p>
-            <a:r>
-              <a:rPr lang="uk-UA" dirty="0" smtClean="0"/>
-              <a:t>Дієслово + сутність</a:t>
-            </a:r>
-            <a:r>
-              <a:rPr lang="en-US" dirty="0" smtClean="0"/>
-              <a:t> (</a:t>
-            </a:r>
-            <a:r>
-              <a:rPr lang="en-US" dirty="0" err="1" smtClean="0"/>
-              <a:t>SaveReport</a:t>
-            </a:r>
-            <a:r>
-              <a:rPr lang="en-US" dirty="0" smtClean="0"/>
-              <a:t>, </a:t>
-            </a:r>
-            <a:r>
-              <a:rPr lang="en-US" dirty="0" err="1" smtClean="0"/>
-              <a:t>CalculateSalary</a:t>
-            </a:r>
-            <a:r>
-              <a:rPr lang="en-US" dirty="0" smtClean="0"/>
-              <a:t>)</a:t>
-            </a:r>
-            <a:endParaRPr lang="uk-UA" dirty="0" smtClean="0"/>
-          </a:p>
-          <a:p>
-            <a:r>
-              <a:rPr lang="uk-UA" dirty="0" smtClean="0"/>
-              <a:t>Дієслово + уточнення</a:t>
-            </a:r>
-            <a:r>
-              <a:rPr lang="ru-RU" dirty="0" smtClean="0"/>
-              <a:t> + </a:t>
-            </a:r>
-            <a:r>
-              <a:rPr lang="uk-UA" dirty="0" smtClean="0"/>
-              <a:t>сутність</a:t>
-            </a:r>
-            <a:r>
-              <a:rPr lang="en-US" dirty="0" smtClean="0"/>
-              <a:t> (</a:t>
-            </a:r>
-            <a:r>
-              <a:rPr lang="en-US" dirty="0" err="1" smtClean="0"/>
-              <a:t>RemoveSelectedReports</a:t>
-            </a:r>
-            <a:r>
-              <a:rPr lang="en-US" dirty="0" smtClean="0"/>
-              <a:t>, </a:t>
-            </a:r>
-            <a:r>
-              <a:rPr lang="en-US" dirty="0" err="1" smtClean="0"/>
-              <a:t>RefreshStaleData</a:t>
-            </a:r>
-            <a:r>
-              <a:rPr lang="en-US" dirty="0" smtClean="0"/>
-              <a:t>)</a:t>
-            </a:r>
-            <a:endParaRPr lang="uk-UA" dirty="0" smtClean="0"/>
-          </a:p>
-          <a:p>
-            <a:r>
-              <a:rPr lang="uk-UA" dirty="0" smtClean="0"/>
-              <a:t>Довгі назви це непогано, погано – незрозумілі назви</a:t>
-            </a:r>
-          </a:p>
-          <a:p>
-            <a:pPr algn="ctr">
-              <a:buNone/>
-            </a:pPr>
+        <p:spPr>
+          <a:xfrm>
+            <a:off x="467544" y="2564904"/>
+            <a:ext cx="8229600" cy="1143000"/>
+          </a:xfrm>
+        </p:spPr>
+        <p:txBody>
+          <a:bodyPr/>
+          <a:lstStyle/>
+          <a:p>
+            <a:r>
+              <a:rPr lang="uk-UA" b="1" dirty="0" err="1" smtClean="0"/>
+              <a:t>Мінімалістичність</a:t>
+            </a:r>
             <a:r>
               <a:rPr lang="uk-UA" b="1" dirty="0" smtClean="0"/>
-              <a:t>Хороша назва функції, показує,</a:t>
-            </a:r>
-            <a:r>
-              <a:rPr lang="en-US" b="1" dirty="0" smtClean="0"/>
-              <a:t> </a:t>
-            </a:r>
-            <a:r>
-              <a:rPr lang="ru-RU" b="1" dirty="0" smtClean="0"/>
-              <a:t>що</a:t>
-            </a:r>
-            <a:r>
-              <a:rPr lang="uk-UA" b="1" dirty="0" smtClean="0"/>
-              <a:t> робить функція без необхідності дивитись на сигнатуру.</a:t>
-            </a:r>
+              <a:t> + повнота</a:t>
+            </a:r>
+            <a:endParaRPr lang="uk-UA" b="1" dirty="0"/>
           </a:p>
         </p:txBody>
       </p:sp>
     </p:spTree>
-    <p:extLst>
-      <p:ext uri="{BB962C8B-B14F-4D97-AF65-F5344CB8AC3E}">
-        <p14:creationId xmlns:p14="http://schemas.microsoft.com/office/powerpoint/2010/main" xmlns="" val="2336217352"/>
-      </p:ext>
-    </p:extLst>
   </p:cSld>
   <p:clrMapOvr>
     <a:masterClrMapping/>
@@ -5703,7 +6252,7 @@
       </p:grpSpPr>
       <p:sp>
         <p:nvSpPr>
-          <p:cNvPr id="2" name="Title 1"/>
+          <p:cNvPr id="2" name="Заголовок 1"/>
           <p:cNvSpPr>
             <a:spLocks noGrp="1"/>
           </p:cNvSpPr>
@@ -5711,30 +6260,12 @@
             <p:ph type="title"/>
           </p:nvPr>
         </p:nvSpPr>
-        <p:spPr/>
-        <p:txBody>
-          <a:bodyPr/>
-          <a:lstStyle/>
-          <a:p>
-            <a:r>
-              <a:rPr lang="uk-UA" dirty="0" smtClean="0"/>
-              <a:t>Реалізація функції</a:t>
-            </a:r>
-            <a:endParaRPr lang="uk-UA" dirty="0"/>
-          </a:p>
-        </p:txBody>
-      </p:sp>
-      <p:sp>
-        <p:nvSpPr>
-          <p:cNvPr id="3" name="Content Placeholder 2"/>
-          <p:cNvSpPr>
-            <a:spLocks noGrp="1"/>
-          </p:cNvSpPr>
-          <p:nvPr>
-            <p:ph idx="1"/>
-          </p:nvPr>
-        </p:nvSpPr>
-        <p:spPr/>
+        <p:spPr>
+          <a:xfrm>
+            <a:off x="395536" y="2564904"/>
+            <a:ext cx="8229600" cy="1143000"/>
+          </a:xfrm>
+        </p:spPr>
         <p:txBody>
           <a:bodyPr>
             <a:normAutofit/>
@@ -5743,36 +6274,13 @@
           <a:p>
             <a:r>
               <a:rPr lang="uk-UA" b="1" dirty="0" smtClean="0"/>
-              <a:t>Один рівень абстракції</a:t>
-            </a:r>
-          </a:p>
-          <a:p>
-            <a:r>
-              <a:rPr lang="uk-UA" b="1" dirty="0" smtClean="0"/>
-              <a:t>Послідовність дій</a:t>
-            </a:r>
-          </a:p>
-          <a:p>
-            <a:r>
-              <a:rPr lang="uk-UA" b="1" dirty="0" smtClean="0"/>
-              <a:t>Все в реалзіації функції має служити безпосередньо поставленій задачі</a:t>
-            </a:r>
-          </a:p>
-          <a:p>
-            <a:pPr marL="971550" lvl="1" indent="-514350">
-              <a:buFont typeface="+mj-lt"/>
-              <a:buAutoNum type="arabicPeriod"/>
-            </a:pPr>
-            <a:endParaRPr lang="uk-UA" dirty="0" smtClean="0"/>
+              <a:t>Реалізація = Механізм + Засоби</a:t>
+            </a:r>
+            <a:endParaRPr lang="uk-UA" b="1" dirty="0"/>
           </a:p>
         </p:txBody>
       </p:sp>
     </p:spTree>
-    <p:extLst>
-      <p:ext uri="{BB962C8B-B14F-4D97-AF65-F5344CB8AC3E}">
-        <p14:creationId xmlns:p14="http://schemas.microsoft.com/office/powerpoint/2010/main" xmlns="" val="940229710"/>
-      </p:ext>
-    </p:extLst>
   </p:cSld>
   <p:clrMapOvr>
     <a:masterClrMapping/>

</xml_diff>